<commit_message>
FLUX circulation of every letter
</commit_message>
<xml_diff>
--- a/src/assets/social-network.pptx
+++ b/src/assets/social-network.pptx
@@ -6,8 +6,9 @@
   </p:sldMasterIdLst>
   <p:sldIdLst>
     <p:sldId id="256" r:id="rId2"/>
-    <p:sldId id="257" r:id="rId3"/>
-    <p:sldId id="258" r:id="rId4"/>
+    <p:sldId id="259" r:id="rId3"/>
+    <p:sldId id="257" r:id="rId4"/>
+    <p:sldId id="258" r:id="rId5"/>
   </p:sldIdLst>
   <p:sldSz cx="12192000" cy="6858000"/>
   <p:notesSz cx="6858000" cy="9144000"/>
@@ -116,6 +117,7 @@
         </p14:section>
         <p14:section name="Content.js" id="{FE3224CD-4C6C-084E-9A2A-F33ADB1D6520}">
           <p14:sldIdLst>
+            <p14:sldId id="259"/>
             <p14:sldId id="257"/>
             <p14:sldId id="258"/>
           </p14:sldIdLst>
@@ -3384,7 +3386,7 @@
         <p:spPr>
           <a:xfrm>
             <a:off x="5106000" y="771525"/>
-            <a:ext cx="1980000" cy="360000"/>
+            <a:ext cx="1980000" cy="369332"/>
           </a:xfrm>
           <a:prstGeom prst="rect">
             <a:avLst/>
@@ -3409,7 +3411,7 @@
                   <a:srgbClr val="212121"/>
                 </a:solidFill>
               </a:rPr>
-              <a:t>I</a:t>
+              <a:t>i</a:t>
             </a:r>
             <a:r>
               <a:rPr lang="en-AM" dirty="0">
@@ -3462,7 +3464,7 @@
                   <a:srgbClr val="212121"/>
                 </a:solidFill>
               </a:rPr>
-              <a:t>app</a:t>
+              <a:t>render</a:t>
             </a:r>
             <a:r>
               <a:rPr lang="en-AM" dirty="0">
@@ -3477,10 +3479,10 @@
       </p:sp>
       <p:sp>
         <p:nvSpPr>
-          <p:cNvPr id="9" name="TextBox 8">
-            <a:extLst>
-              <a:ext uri="{FF2B5EF4-FFF2-40B4-BE49-F238E27FC236}">
-                <a16:creationId xmlns:a16="http://schemas.microsoft.com/office/drawing/2014/main" id="{92EC1DAD-B77E-7643-9325-8587FAC8E231}"/>
+          <p:cNvPr id="10" name="TextBox 9">
+            <a:extLst>
+              <a:ext uri="{FF2B5EF4-FFF2-40B4-BE49-F238E27FC236}">
+                <a16:creationId xmlns:a16="http://schemas.microsoft.com/office/drawing/2014/main" id="{6254F5E2-35E5-EA46-9205-76571181756C}"/>
               </a:ext>
             </a:extLst>
           </p:cNvPr>
@@ -3489,7 +3491,7 @@
         </p:nvSpPr>
         <p:spPr>
           <a:xfrm>
-            <a:off x="2407200" y="2244251"/>
+            <a:off x="5106000" y="2244251"/>
             <a:ext cx="1980000" cy="369332"/>
           </a:xfrm>
           <a:prstGeom prst="rect">
@@ -3515,7 +3517,7 @@
                   <a:srgbClr val="212121"/>
                 </a:solidFill>
               </a:rPr>
-              <a:t>h</a:t>
+              <a:t>app</a:t>
             </a:r>
             <a:r>
               <a:rPr lang="en-AM" dirty="0">
@@ -3523,17 +3525,18 @@
                   <a:srgbClr val="212121"/>
                 </a:solidFill>
               </a:rPr>
-              <a:t>eader.js</a:t>
-            </a:r>
-          </a:p>
-        </p:txBody>
-      </p:sp>
-      <p:sp>
-        <p:nvSpPr>
-          <p:cNvPr id="10" name="TextBox 9">
-            <a:extLst>
-              <a:ext uri="{FF2B5EF4-FFF2-40B4-BE49-F238E27FC236}">
-                <a16:creationId xmlns:a16="http://schemas.microsoft.com/office/drawing/2014/main" id="{6254F5E2-35E5-EA46-9205-76571181756C}"/>
+              <a:t>.js</a:t>
+            </a:r>
+          </a:p>
+        </p:txBody>
+      </p:sp>
+      <p:sp>
+        <p:nvSpPr>
+          <p:cNvPr id="67" name="TextBox 66">
+            <a:hlinkClick r:id="rId2" action="ppaction://hlinksldjump"/>
+            <a:extLst>
+              <a:ext uri="{FF2B5EF4-FFF2-40B4-BE49-F238E27FC236}">
+                <a16:creationId xmlns:a16="http://schemas.microsoft.com/office/drawing/2014/main" id="{F12FFD72-DA71-8245-8165-CDB63F5B1DFC}"/>
               </a:ext>
             </a:extLst>
           </p:cNvPr>
@@ -3542,7 +3545,55 @@
         </p:nvSpPr>
         <p:spPr>
           <a:xfrm>
-            <a:off x="5106000" y="2244251"/>
+            <a:off x="63795" y="63795"/>
+            <a:ext cx="899331" cy="338554"/>
+          </a:xfrm>
+          <a:prstGeom prst="rect">
+            <a:avLst/>
+          </a:prstGeom>
+          <a:noFill/>
+          <a:ln cap="sq">
+            <a:noFill/>
+          </a:ln>
+        </p:spPr>
+        <p:txBody>
+          <a:bodyPr wrap="square" rtlCol="0">
+            <a:spAutoFit/>
+          </a:bodyPr>
+          <a:lstStyle/>
+          <a:p>
+            <a:pPr algn="ctr"/>
+            <a:r>
+              <a:rPr lang="en-US" sz="1600" dirty="0">
+                <a:solidFill>
+                  <a:srgbClr val="5B9BD5"/>
+                </a:solidFill>
+              </a:rPr>
+              <a:t>Home</a:t>
+            </a:r>
+            <a:endParaRPr lang="en-AM" sz="1600" dirty="0">
+              <a:solidFill>
+                <a:srgbClr val="5B9BD5"/>
+              </a:solidFill>
+            </a:endParaRPr>
+          </a:p>
+        </p:txBody>
+      </p:sp>
+      <p:sp>
+        <p:nvSpPr>
+          <p:cNvPr id="68" name="TextBox 67">
+            <a:extLst>
+              <a:ext uri="{FF2B5EF4-FFF2-40B4-BE49-F238E27FC236}">
+                <a16:creationId xmlns:a16="http://schemas.microsoft.com/office/drawing/2014/main" id="{E15474DC-6D01-934F-A2B0-CF8C6F1A73D0}"/>
+              </a:ext>
+            </a:extLst>
+          </p:cNvPr>
+          <p:cNvSpPr txBox="1"/>
+          <p:nvPr/>
+        </p:nvSpPr>
+        <p:spPr>
+          <a:xfrm>
+            <a:off x="2407200" y="771525"/>
             <a:ext cx="1980000" cy="369332"/>
           </a:xfrm>
           <a:prstGeom prst="rect">
@@ -3563,30 +3614,22 @@
           <a:p>
             <a:pPr algn="ctr"/>
             <a:r>
-              <a:rPr lang="en-US" dirty="0">
-                <a:solidFill>
-                  <a:srgbClr val="212121"/>
-                </a:solidFill>
-              </a:rPr>
-              <a:t>n</a:t>
-            </a:r>
-            <a:r>
               <a:rPr lang="en-AM" dirty="0">
                 <a:solidFill>
                   <a:srgbClr val="212121"/>
                 </a:solidFill>
               </a:rPr>
-              <a:t>avbar.js</a:t>
-            </a:r>
-          </a:p>
-        </p:txBody>
-      </p:sp>
-      <p:sp>
-        <p:nvSpPr>
-          <p:cNvPr id="11" name="TextBox 10">
-            <a:extLst>
-              <a:ext uri="{FF2B5EF4-FFF2-40B4-BE49-F238E27FC236}">
-                <a16:creationId xmlns:a16="http://schemas.microsoft.com/office/drawing/2014/main" id="{10D5672C-863E-3645-9309-83C439402B99}"/>
+              <a:t>state.js</a:t>
+            </a:r>
+          </a:p>
+        </p:txBody>
+      </p:sp>
+      <p:sp>
+        <p:nvSpPr>
+          <p:cNvPr id="73" name="TextBox 72">
+            <a:extLst>
+              <a:ext uri="{FF2B5EF4-FFF2-40B4-BE49-F238E27FC236}">
+                <a16:creationId xmlns:a16="http://schemas.microsoft.com/office/drawing/2014/main" id="{1AE439E4-B14D-0C44-86C0-8180B3EBC5A1}"/>
               </a:ext>
             </a:extLst>
           </p:cNvPr>
@@ -3595,7 +3638,7 @@
         </p:nvSpPr>
         <p:spPr>
           <a:xfrm>
-            <a:off x="7804800" y="2247508"/>
+            <a:off x="2407200" y="3003491"/>
             <a:ext cx="1980000" cy="369332"/>
           </a:xfrm>
           <a:prstGeom prst="rect">
@@ -3621,7 +3664,7 @@
                   <a:srgbClr val="212121"/>
                 </a:solidFill>
               </a:rPr>
-              <a:t>content</a:t>
+              <a:t>h</a:t>
             </a:r>
             <a:r>
               <a:rPr lang="en-AM" dirty="0">
@@ -3629,216 +3672,17 @@
                   <a:srgbClr val="212121"/>
                 </a:solidFill>
               </a:rPr>
-              <a:t>.js</a:t>
-            </a:r>
-          </a:p>
-        </p:txBody>
-      </p:sp>
-      <p:cxnSp>
-        <p:nvCxnSpPr>
-          <p:cNvPr id="15" name="Straight Connector 14">
-            <a:extLst>
-              <a:ext uri="{FF2B5EF4-FFF2-40B4-BE49-F238E27FC236}">
-                <a16:creationId xmlns:a16="http://schemas.microsoft.com/office/drawing/2014/main" id="{7B017641-6A90-6640-BA39-A8D321E6AD65}"/>
-              </a:ext>
-            </a:extLst>
-          </p:cNvPr>
-          <p:cNvCxnSpPr>
-            <a:stCxn id="5" idx="2"/>
-            <a:endCxn id="8" idx="0"/>
-          </p:cNvCxnSpPr>
-          <p:nvPr/>
-        </p:nvCxnSpPr>
-        <p:spPr>
-          <a:xfrm>
-            <a:off x="6096000" y="1131525"/>
-            <a:ext cx="0" cy="360000"/>
-          </a:xfrm>
-          <a:prstGeom prst="line">
-            <a:avLst/>
-          </a:prstGeom>
-        </p:spPr>
-        <p:style>
-          <a:lnRef idx="2">
-            <a:schemeClr val="accent5"/>
-          </a:lnRef>
-          <a:fillRef idx="0">
-            <a:schemeClr val="accent5"/>
-          </a:fillRef>
-          <a:effectRef idx="1">
-            <a:schemeClr val="accent5"/>
-          </a:effectRef>
-          <a:fontRef idx="minor">
-            <a:schemeClr val="tx1"/>
-          </a:fontRef>
-        </p:style>
-      </p:cxnSp>
-      <p:cxnSp>
-        <p:nvCxnSpPr>
-          <p:cNvPr id="16" name="Straight Connector 15">
-            <a:extLst>
-              <a:ext uri="{FF2B5EF4-FFF2-40B4-BE49-F238E27FC236}">
-                <a16:creationId xmlns:a16="http://schemas.microsoft.com/office/drawing/2014/main" id="{CC7B0AEE-119E-DE46-8820-BD34D7EB4FDD}"/>
-              </a:ext>
-            </a:extLst>
-          </p:cNvPr>
-          <p:cNvCxnSpPr>
-            <a:cxnSpLocks/>
-            <a:stCxn id="9" idx="0"/>
-            <a:endCxn id="8" idx="2"/>
-          </p:cNvCxnSpPr>
-          <p:nvPr/>
-        </p:nvCxnSpPr>
-        <p:spPr>
-          <a:xfrm flipV="1">
-            <a:off x="3397200" y="1860857"/>
-            <a:ext cx="2698800" cy="383394"/>
-          </a:xfrm>
-          <a:prstGeom prst="line">
-            <a:avLst/>
-          </a:prstGeom>
-        </p:spPr>
-        <p:style>
-          <a:lnRef idx="2">
-            <a:schemeClr val="accent5"/>
-          </a:lnRef>
-          <a:fillRef idx="0">
-            <a:schemeClr val="accent5"/>
-          </a:fillRef>
-          <a:effectRef idx="1">
-            <a:schemeClr val="accent5"/>
-          </a:effectRef>
-          <a:fontRef idx="minor">
-            <a:schemeClr val="tx1"/>
-          </a:fontRef>
-        </p:style>
-      </p:cxnSp>
-      <p:cxnSp>
-        <p:nvCxnSpPr>
-          <p:cNvPr id="19" name="Straight Connector 18">
-            <a:extLst>
-              <a:ext uri="{FF2B5EF4-FFF2-40B4-BE49-F238E27FC236}">
-                <a16:creationId xmlns:a16="http://schemas.microsoft.com/office/drawing/2014/main" id="{ED447894-D9C7-A249-BC50-97BAF49DFB09}"/>
-              </a:ext>
-            </a:extLst>
-          </p:cNvPr>
-          <p:cNvCxnSpPr>
-            <a:cxnSpLocks/>
-            <a:stCxn id="8" idx="2"/>
-            <a:endCxn id="11" idx="0"/>
-          </p:cNvCxnSpPr>
-          <p:nvPr/>
-        </p:nvCxnSpPr>
-        <p:spPr>
-          <a:xfrm>
-            <a:off x="6096000" y="1860857"/>
-            <a:ext cx="2698800" cy="386651"/>
-          </a:xfrm>
-          <a:prstGeom prst="line">
-            <a:avLst/>
-          </a:prstGeom>
-        </p:spPr>
-        <p:style>
-          <a:lnRef idx="2">
-            <a:schemeClr val="accent5"/>
-          </a:lnRef>
-          <a:fillRef idx="0">
-            <a:schemeClr val="accent5"/>
-          </a:fillRef>
-          <a:effectRef idx="1">
-            <a:schemeClr val="accent5"/>
-          </a:effectRef>
-          <a:fontRef idx="minor">
-            <a:schemeClr val="tx1"/>
-          </a:fontRef>
-        </p:style>
-      </p:cxnSp>
-      <p:cxnSp>
-        <p:nvCxnSpPr>
-          <p:cNvPr id="22" name="Straight Connector 21">
-            <a:extLst>
-              <a:ext uri="{FF2B5EF4-FFF2-40B4-BE49-F238E27FC236}">
-                <a16:creationId xmlns:a16="http://schemas.microsoft.com/office/drawing/2014/main" id="{C643F2E3-36A8-134C-8D74-257FAC7E899A}"/>
-              </a:ext>
-            </a:extLst>
-          </p:cNvPr>
-          <p:cNvCxnSpPr>
-            <a:cxnSpLocks/>
-            <a:stCxn id="8" idx="2"/>
-            <a:endCxn id="10" idx="0"/>
-          </p:cNvCxnSpPr>
-          <p:nvPr/>
-        </p:nvCxnSpPr>
-        <p:spPr>
-          <a:xfrm>
-            <a:off x="6096000" y="1860857"/>
-            <a:ext cx="0" cy="383394"/>
-          </a:xfrm>
-          <a:prstGeom prst="line">
-            <a:avLst/>
-          </a:prstGeom>
-        </p:spPr>
-        <p:style>
-          <a:lnRef idx="2">
-            <a:schemeClr val="accent5"/>
-          </a:lnRef>
-          <a:fillRef idx="0">
-            <a:schemeClr val="accent5"/>
-          </a:fillRef>
-          <a:effectRef idx="1">
-            <a:schemeClr val="accent5"/>
-          </a:effectRef>
-          <a:fontRef idx="minor">
-            <a:schemeClr val="tx1"/>
-          </a:fontRef>
-        </p:style>
-      </p:cxnSp>
-      <p:cxnSp>
-        <p:nvCxnSpPr>
-          <p:cNvPr id="26" name="Elbow Connector 25">
-            <a:extLst>
-              <a:ext uri="{FF2B5EF4-FFF2-40B4-BE49-F238E27FC236}">
-                <a16:creationId xmlns:a16="http://schemas.microsoft.com/office/drawing/2014/main" id="{6C7051FB-0745-CB48-8FA4-D8273A659350}"/>
-              </a:ext>
-            </a:extLst>
-          </p:cNvPr>
-          <p:cNvCxnSpPr>
-            <a:cxnSpLocks/>
-            <a:stCxn id="11" idx="2"/>
-          </p:cNvCxnSpPr>
-          <p:nvPr/>
-        </p:nvCxnSpPr>
-        <p:spPr>
-          <a:xfrm rot="5400000">
-            <a:off x="8080723" y="2109973"/>
-            <a:ext cx="207210" cy="1220944"/>
-          </a:xfrm>
-          <a:prstGeom prst="bentConnector2">
-            <a:avLst/>
-          </a:prstGeom>
-        </p:spPr>
-        <p:style>
-          <a:lnRef idx="2">
-            <a:schemeClr val="accent5"/>
-          </a:lnRef>
-          <a:fillRef idx="0">
-            <a:schemeClr val="accent5"/>
-          </a:fillRef>
-          <a:effectRef idx="1">
-            <a:schemeClr val="accent5"/>
-          </a:effectRef>
-          <a:fontRef idx="minor">
-            <a:schemeClr val="tx1"/>
-          </a:fontRef>
-        </p:style>
-      </p:cxnSp>
-      <p:sp>
-        <p:nvSpPr>
-          <p:cNvPr id="27" name="TextBox 26">
-            <a:hlinkClick r:id="rId2" action="ppaction://hlinksldjump"/>
-            <a:extLst>
-              <a:ext uri="{FF2B5EF4-FFF2-40B4-BE49-F238E27FC236}">
-                <a16:creationId xmlns:a16="http://schemas.microsoft.com/office/drawing/2014/main" id="{C167CD91-2DDD-9E44-819E-C51B623CC4E7}"/>
+              <a:t>eader.js</a:t>
+            </a:r>
+          </a:p>
+        </p:txBody>
+      </p:sp>
+      <p:sp>
+        <p:nvSpPr>
+          <p:cNvPr id="74" name="TextBox 73">
+            <a:extLst>
+              <a:ext uri="{FF2B5EF4-FFF2-40B4-BE49-F238E27FC236}">
+                <a16:creationId xmlns:a16="http://schemas.microsoft.com/office/drawing/2014/main" id="{8CC59546-79CC-AA49-B480-835473FFCF8D}"/>
               </a:ext>
             </a:extLst>
           </p:cNvPr>
@@ -3847,7 +3691,7 @@
         </p:nvSpPr>
         <p:spPr>
           <a:xfrm>
-            <a:off x="7804800" y="3008716"/>
+            <a:off x="5106000" y="3003491"/>
             <a:ext cx="1980000" cy="369332"/>
           </a:xfrm>
           <a:prstGeom prst="rect">
@@ -3868,23 +3712,31 @@
           <a:p>
             <a:pPr algn="ctr"/>
             <a:r>
+              <a:rPr lang="en-US" dirty="0">
+                <a:solidFill>
+                  <a:srgbClr val="212121"/>
+                </a:solidFill>
+              </a:rPr>
+              <a:t>n</a:t>
+            </a:r>
+            <a:r>
               <a:rPr lang="en-AM" dirty="0">
                 <a:solidFill>
                   <a:srgbClr val="212121"/>
                 </a:solidFill>
               </a:rPr>
-              <a:t>proflie.js</a:t>
-            </a:r>
-          </a:p>
-        </p:txBody>
-      </p:sp>
-      <p:sp>
-        <p:nvSpPr>
-          <p:cNvPr id="29" name="TextBox 28">
+              <a:t>avbar.js</a:t>
+            </a:r>
+          </a:p>
+        </p:txBody>
+      </p:sp>
+      <p:sp>
+        <p:nvSpPr>
+          <p:cNvPr id="75" name="TextBox 74">
             <a:hlinkClick r:id="rId3" action="ppaction://hlinksldjump"/>
             <a:extLst>
               <a:ext uri="{FF2B5EF4-FFF2-40B4-BE49-F238E27FC236}">
-                <a16:creationId xmlns:a16="http://schemas.microsoft.com/office/drawing/2014/main" id="{508562EB-02E3-B044-AC1E-960D51A43DBC}"/>
+                <a16:creationId xmlns:a16="http://schemas.microsoft.com/office/drawing/2014/main" id="{CDE18B5C-5DA2-FC4A-92C0-F44207F762FE}"/>
               </a:ext>
             </a:extLst>
           </p:cNvPr>
@@ -3893,7 +3745,7 @@
         </p:nvSpPr>
         <p:spPr>
           <a:xfrm>
-            <a:off x="7819088" y="3488400"/>
+            <a:off x="7804800" y="3006748"/>
             <a:ext cx="1980000" cy="369332"/>
           </a:xfrm>
           <a:prstGeom prst="rect">
@@ -3914,8 +3766,12 @@
           <a:p>
             <a:pPr algn="ctr"/>
             <a:r>
-              <a:rPr lang="en-US" dirty="0"/>
-              <a:t>messages</a:t>
+              <a:rPr lang="en-US" dirty="0">
+                <a:solidFill>
+                  <a:srgbClr val="212121"/>
+                </a:solidFill>
+              </a:rPr>
+              <a:t>content</a:t>
             </a:r>
             <a:r>
               <a:rPr lang="en-AM" dirty="0">
@@ -3928,240 +3784,33 @@
           </a:p>
         </p:txBody>
       </p:sp>
-      <p:sp>
-        <p:nvSpPr>
-          <p:cNvPr id="33" name="TextBox 32">
-            <a:extLst>
-              <a:ext uri="{FF2B5EF4-FFF2-40B4-BE49-F238E27FC236}">
-                <a16:creationId xmlns:a16="http://schemas.microsoft.com/office/drawing/2014/main" id="{272D2062-9C25-4441-87CB-2638C6BD7420}"/>
-              </a:ext>
-            </a:extLst>
-          </p:cNvPr>
-          <p:cNvSpPr txBox="1"/>
-          <p:nvPr/>
-        </p:nvSpPr>
-        <p:spPr>
-          <a:xfrm>
-            <a:off x="7804800" y="3968084"/>
-            <a:ext cx="1980000" cy="369332"/>
-          </a:xfrm>
-          <a:prstGeom prst="rect">
-            <a:avLst/>
-          </a:prstGeom>
-          <a:noFill/>
-          <a:ln cap="sq">
-            <a:solidFill>
-              <a:srgbClr val="212121"/>
-            </a:solidFill>
-          </a:ln>
-        </p:spPr>
-        <p:txBody>
-          <a:bodyPr wrap="square" rtlCol="0">
-            <a:spAutoFit/>
-          </a:bodyPr>
-          <a:lstStyle/>
-          <a:p>
-            <a:pPr algn="ctr"/>
-            <a:r>
-              <a:rPr lang="en-US" dirty="0">
-                <a:solidFill>
-                  <a:srgbClr val="212121"/>
-                </a:solidFill>
-              </a:rPr>
-              <a:t>users</a:t>
-            </a:r>
-            <a:r>
-              <a:rPr lang="en-AM" dirty="0">
-                <a:solidFill>
-                  <a:srgbClr val="212121"/>
-                </a:solidFill>
-              </a:rPr>
-              <a:t>.js</a:t>
-            </a:r>
-          </a:p>
-        </p:txBody>
-      </p:sp>
-      <p:sp>
-        <p:nvSpPr>
-          <p:cNvPr id="34" name="TextBox 33">
-            <a:extLst>
-              <a:ext uri="{FF2B5EF4-FFF2-40B4-BE49-F238E27FC236}">
-                <a16:creationId xmlns:a16="http://schemas.microsoft.com/office/drawing/2014/main" id="{26429301-96CB-994C-957E-48A832087BF4}"/>
-              </a:ext>
-            </a:extLst>
-          </p:cNvPr>
-          <p:cNvSpPr txBox="1"/>
-          <p:nvPr/>
-        </p:nvSpPr>
-        <p:spPr>
-          <a:xfrm>
-            <a:off x="7804800" y="4447768"/>
-            <a:ext cx="1980000" cy="369332"/>
-          </a:xfrm>
-          <a:prstGeom prst="rect">
-            <a:avLst/>
-          </a:prstGeom>
-          <a:noFill/>
-          <a:ln cap="sq">
-            <a:solidFill>
-              <a:srgbClr val="212121"/>
-            </a:solidFill>
-          </a:ln>
-        </p:spPr>
-        <p:txBody>
-          <a:bodyPr wrap="square" rtlCol="0">
-            <a:spAutoFit/>
-          </a:bodyPr>
-          <a:lstStyle/>
-          <a:p>
-            <a:pPr algn="ctr"/>
-            <a:r>
-              <a:rPr lang="en-US" dirty="0">
-                <a:solidFill>
-                  <a:srgbClr val="212121"/>
-                </a:solidFill>
-              </a:rPr>
-              <a:t>news</a:t>
-            </a:r>
-            <a:r>
-              <a:rPr lang="en-AM" dirty="0">
-                <a:solidFill>
-                  <a:srgbClr val="212121"/>
-                </a:solidFill>
-              </a:rPr>
-              <a:t>.js</a:t>
-            </a:r>
-          </a:p>
-        </p:txBody>
-      </p:sp>
-      <p:sp>
-        <p:nvSpPr>
-          <p:cNvPr id="35" name="TextBox 34">
-            <a:extLst>
-              <a:ext uri="{FF2B5EF4-FFF2-40B4-BE49-F238E27FC236}">
-                <a16:creationId xmlns:a16="http://schemas.microsoft.com/office/drawing/2014/main" id="{3E3BB8FA-4A28-A34A-AB9F-77FABF0A74F0}"/>
-              </a:ext>
-            </a:extLst>
-          </p:cNvPr>
-          <p:cNvSpPr txBox="1"/>
-          <p:nvPr/>
-        </p:nvSpPr>
-        <p:spPr>
-          <a:xfrm>
-            <a:off x="7804800" y="4927452"/>
-            <a:ext cx="1980000" cy="369332"/>
-          </a:xfrm>
-          <a:prstGeom prst="rect">
-            <a:avLst/>
-          </a:prstGeom>
-          <a:noFill/>
-          <a:ln cap="sq">
-            <a:solidFill>
-              <a:srgbClr val="212121"/>
-            </a:solidFill>
-          </a:ln>
-        </p:spPr>
-        <p:txBody>
-          <a:bodyPr wrap="square" rtlCol="0">
-            <a:spAutoFit/>
-          </a:bodyPr>
-          <a:lstStyle/>
-          <a:p>
-            <a:pPr algn="ctr"/>
-            <a:r>
-              <a:rPr lang="en-US" dirty="0">
-                <a:solidFill>
-                  <a:srgbClr val="212121"/>
-                </a:solidFill>
-              </a:rPr>
-              <a:t>music</a:t>
-            </a:r>
-            <a:r>
-              <a:rPr lang="en-AM" dirty="0">
-                <a:solidFill>
-                  <a:srgbClr val="212121"/>
-                </a:solidFill>
-              </a:rPr>
-              <a:t>.js</a:t>
-            </a:r>
-          </a:p>
-        </p:txBody>
-      </p:sp>
-      <p:sp>
-        <p:nvSpPr>
-          <p:cNvPr id="36" name="TextBox 35">
-            <a:extLst>
-              <a:ext uri="{FF2B5EF4-FFF2-40B4-BE49-F238E27FC236}">
-                <a16:creationId xmlns:a16="http://schemas.microsoft.com/office/drawing/2014/main" id="{7FBD173D-C748-A848-8D01-B72AD620FBF2}"/>
-              </a:ext>
-            </a:extLst>
-          </p:cNvPr>
-          <p:cNvSpPr txBox="1"/>
-          <p:nvPr/>
-        </p:nvSpPr>
-        <p:spPr>
-          <a:xfrm>
-            <a:off x="7804800" y="5407136"/>
-            <a:ext cx="1980000" cy="369332"/>
-          </a:xfrm>
-          <a:prstGeom prst="rect">
-            <a:avLst/>
-          </a:prstGeom>
-          <a:noFill/>
-          <a:ln cap="sq">
-            <a:solidFill>
-              <a:srgbClr val="212121"/>
-            </a:solidFill>
-          </a:ln>
-        </p:spPr>
-        <p:txBody>
-          <a:bodyPr wrap="square" rtlCol="0">
-            <a:spAutoFit/>
-          </a:bodyPr>
-          <a:lstStyle/>
-          <a:p>
-            <a:pPr algn="ctr"/>
-            <a:r>
-              <a:rPr lang="en-US" dirty="0">
-                <a:solidFill>
-                  <a:srgbClr val="212121"/>
-                </a:solidFill>
-              </a:rPr>
-              <a:t>settings</a:t>
-            </a:r>
-            <a:r>
-              <a:rPr lang="en-AM" dirty="0">
-                <a:solidFill>
-                  <a:srgbClr val="212121"/>
-                </a:solidFill>
-              </a:rPr>
-              <a:t>.js</a:t>
-            </a:r>
-          </a:p>
-        </p:txBody>
-      </p:sp>
       <p:cxnSp>
         <p:nvCxnSpPr>
-          <p:cNvPr id="53" name="Straight Connector 52">
-            <a:extLst>
-              <a:ext uri="{FF2B5EF4-FFF2-40B4-BE49-F238E27FC236}">
-                <a16:creationId xmlns:a16="http://schemas.microsoft.com/office/drawing/2014/main" id="{0ECC9334-38B0-4840-8E10-12458768DA40}"/>
+          <p:cNvPr id="89" name="Straight Arrow Connector 88">
+            <a:extLst>
+              <a:ext uri="{FF2B5EF4-FFF2-40B4-BE49-F238E27FC236}">
+                <a16:creationId xmlns:a16="http://schemas.microsoft.com/office/drawing/2014/main" id="{7DA19780-E83E-824A-9E54-E87FDC204A17}"/>
               </a:ext>
             </a:extLst>
           </p:cNvPr>
           <p:cNvCxnSpPr>
             <a:cxnSpLocks/>
+            <a:stCxn id="73" idx="0"/>
+            <a:endCxn id="10" idx="2"/>
           </p:cNvCxnSpPr>
           <p:nvPr/>
         </p:nvCxnSpPr>
         <p:spPr>
           <a:xfrm flipV="1">
-            <a:off x="7577627" y="2824050"/>
-            <a:ext cx="0" cy="2767752"/>
-          </a:xfrm>
-          <a:prstGeom prst="line">
+            <a:off x="3397200" y="2613583"/>
+            <a:ext cx="2698800" cy="389908"/>
+          </a:xfrm>
+          <a:prstGeom prst="straightConnector1">
             <a:avLst/>
           </a:prstGeom>
+          <a:ln>
+            <a:tailEnd type="triangle"/>
+          </a:ln>
         </p:spPr>
         <p:style>
           <a:lnRef idx="2">
@@ -4180,27 +3829,31 @@
       </p:cxnSp>
       <p:cxnSp>
         <p:nvCxnSpPr>
-          <p:cNvPr id="58" name="Straight Connector 57">
-            <a:extLst>
-              <a:ext uri="{FF2B5EF4-FFF2-40B4-BE49-F238E27FC236}">
-                <a16:creationId xmlns:a16="http://schemas.microsoft.com/office/drawing/2014/main" id="{7510B2CA-2DC8-2949-80DE-46EBDEE4F0CD}"/>
+          <p:cNvPr id="91" name="Straight Arrow Connector 90">
+            <a:extLst>
+              <a:ext uri="{FF2B5EF4-FFF2-40B4-BE49-F238E27FC236}">
+                <a16:creationId xmlns:a16="http://schemas.microsoft.com/office/drawing/2014/main" id="{1D79FD3B-8FD1-3C47-A5E7-6308D9CA3474}"/>
               </a:ext>
             </a:extLst>
           </p:cNvPr>
           <p:cNvCxnSpPr>
             <a:cxnSpLocks/>
-            <a:endCxn id="27" idx="1"/>
+            <a:stCxn id="75" idx="0"/>
+            <a:endCxn id="10" idx="2"/>
           </p:cNvCxnSpPr>
           <p:nvPr/>
         </p:nvCxnSpPr>
         <p:spPr>
-          <a:xfrm>
-            <a:off x="7573856" y="3193382"/>
-            <a:ext cx="230944" cy="0"/>
-          </a:xfrm>
-          <a:prstGeom prst="line">
+          <a:xfrm flipH="1" flipV="1">
+            <a:off x="6096000" y="2613583"/>
+            <a:ext cx="2698800" cy="393165"/>
+          </a:xfrm>
+          <a:prstGeom prst="straightConnector1">
             <a:avLst/>
           </a:prstGeom>
+          <a:ln>
+            <a:tailEnd type="triangle"/>
+          </a:ln>
         </p:spPr>
         <p:style>
           <a:lnRef idx="2">
@@ -4219,26 +3872,31 @@
       </p:cxnSp>
       <p:cxnSp>
         <p:nvCxnSpPr>
-          <p:cNvPr id="61" name="Straight Connector 60">
-            <a:extLst>
-              <a:ext uri="{FF2B5EF4-FFF2-40B4-BE49-F238E27FC236}">
-                <a16:creationId xmlns:a16="http://schemas.microsoft.com/office/drawing/2014/main" id="{3FB2CBE8-F458-504B-B72E-D45DE2A95797}"/>
+          <p:cNvPr id="92" name="Straight Arrow Connector 91">
+            <a:extLst>
+              <a:ext uri="{FF2B5EF4-FFF2-40B4-BE49-F238E27FC236}">
+                <a16:creationId xmlns:a16="http://schemas.microsoft.com/office/drawing/2014/main" id="{7487A719-F51B-8049-9172-88A9832884C3}"/>
               </a:ext>
             </a:extLst>
           </p:cNvPr>
           <p:cNvCxnSpPr>
             <a:cxnSpLocks/>
+            <a:stCxn id="74" idx="0"/>
+            <a:endCxn id="10" idx="2"/>
           </p:cNvCxnSpPr>
           <p:nvPr/>
         </p:nvCxnSpPr>
         <p:spPr>
-          <a:xfrm>
-            <a:off x="7573856" y="3673066"/>
-            <a:ext cx="230944" cy="0"/>
-          </a:xfrm>
-          <a:prstGeom prst="line">
+          <a:xfrm flipV="1">
+            <a:off x="6096000" y="2613583"/>
+            <a:ext cx="0" cy="389908"/>
+          </a:xfrm>
+          <a:prstGeom prst="straightConnector1">
             <a:avLst/>
           </a:prstGeom>
+          <a:ln>
+            <a:tailEnd type="triangle"/>
+          </a:ln>
         </p:spPr>
         <p:style>
           <a:lnRef idx="2">
@@ -4257,26 +3915,31 @@
       </p:cxnSp>
       <p:cxnSp>
         <p:nvCxnSpPr>
-          <p:cNvPr id="62" name="Straight Connector 61">
-            <a:extLst>
-              <a:ext uri="{FF2B5EF4-FFF2-40B4-BE49-F238E27FC236}">
-                <a16:creationId xmlns:a16="http://schemas.microsoft.com/office/drawing/2014/main" id="{32ED3222-2A7F-5743-905A-ECC1A8C3BC79}"/>
+          <p:cNvPr id="97" name="Straight Arrow Connector 96">
+            <a:extLst>
+              <a:ext uri="{FF2B5EF4-FFF2-40B4-BE49-F238E27FC236}">
+                <a16:creationId xmlns:a16="http://schemas.microsoft.com/office/drawing/2014/main" id="{D9E5F27A-DFFF-F14A-9253-2794D52FE9F8}"/>
               </a:ext>
             </a:extLst>
           </p:cNvPr>
           <p:cNvCxnSpPr>
             <a:cxnSpLocks/>
+            <a:stCxn id="10" idx="0"/>
+            <a:endCxn id="8" idx="2"/>
           </p:cNvCxnSpPr>
           <p:nvPr/>
         </p:nvCxnSpPr>
         <p:spPr>
-          <a:xfrm>
-            <a:off x="7573856" y="4152750"/>
-            <a:ext cx="230944" cy="0"/>
-          </a:xfrm>
-          <a:prstGeom prst="line">
+          <a:xfrm flipV="1">
+            <a:off x="6096000" y="1860857"/>
+            <a:ext cx="0" cy="383394"/>
+          </a:xfrm>
+          <a:prstGeom prst="straightConnector1">
             <a:avLst/>
           </a:prstGeom>
+          <a:ln>
+            <a:tailEnd type="triangle"/>
+          </a:ln>
         </p:spPr>
         <p:style>
           <a:lnRef idx="2">
@@ -4295,26 +3958,31 @@
       </p:cxnSp>
       <p:cxnSp>
         <p:nvCxnSpPr>
-          <p:cNvPr id="63" name="Straight Connector 62">
-            <a:extLst>
-              <a:ext uri="{FF2B5EF4-FFF2-40B4-BE49-F238E27FC236}">
-                <a16:creationId xmlns:a16="http://schemas.microsoft.com/office/drawing/2014/main" id="{C65F2E9A-6B78-3248-BACC-85566F8483B1}"/>
+          <p:cNvPr id="100" name="Straight Arrow Connector 99">
+            <a:extLst>
+              <a:ext uri="{FF2B5EF4-FFF2-40B4-BE49-F238E27FC236}">
+                <a16:creationId xmlns:a16="http://schemas.microsoft.com/office/drawing/2014/main" id="{0021D652-D53B-6448-88C9-56A83AF70C42}"/>
               </a:ext>
             </a:extLst>
           </p:cNvPr>
           <p:cNvCxnSpPr>
             <a:cxnSpLocks/>
+            <a:stCxn id="8" idx="0"/>
+            <a:endCxn id="5" idx="2"/>
           </p:cNvCxnSpPr>
           <p:nvPr/>
         </p:nvCxnSpPr>
         <p:spPr>
-          <a:xfrm>
-            <a:off x="7573856" y="4632434"/>
-            <a:ext cx="230944" cy="0"/>
-          </a:xfrm>
-          <a:prstGeom prst="line">
+          <a:xfrm flipV="1">
+            <a:off x="6096000" y="1140857"/>
+            <a:ext cx="0" cy="350668"/>
+          </a:xfrm>
+          <a:prstGeom prst="straightConnector1">
             <a:avLst/>
           </a:prstGeom>
+          <a:ln>
+            <a:tailEnd type="triangle"/>
+          </a:ln>
         </p:spPr>
         <p:style>
           <a:lnRef idx="2">
@@ -4333,26 +4001,31 @@
       </p:cxnSp>
       <p:cxnSp>
         <p:nvCxnSpPr>
-          <p:cNvPr id="64" name="Straight Connector 63">
-            <a:extLst>
-              <a:ext uri="{FF2B5EF4-FFF2-40B4-BE49-F238E27FC236}">
-                <a16:creationId xmlns:a16="http://schemas.microsoft.com/office/drawing/2014/main" id="{94D24CEE-01C2-D349-8697-5B7E43AB7D84}"/>
+          <p:cNvPr id="103" name="Straight Arrow Connector 102">
+            <a:extLst>
+              <a:ext uri="{FF2B5EF4-FFF2-40B4-BE49-F238E27FC236}">
+                <a16:creationId xmlns:a16="http://schemas.microsoft.com/office/drawing/2014/main" id="{23918193-58D0-EB43-8E2C-1363CDC0C122}"/>
               </a:ext>
             </a:extLst>
           </p:cNvPr>
           <p:cNvCxnSpPr>
             <a:cxnSpLocks/>
+            <a:stCxn id="8" idx="0"/>
+            <a:endCxn id="68" idx="2"/>
           </p:cNvCxnSpPr>
           <p:nvPr/>
         </p:nvCxnSpPr>
         <p:spPr>
-          <a:xfrm>
-            <a:off x="7573856" y="5112118"/>
-            <a:ext cx="230944" cy="0"/>
-          </a:xfrm>
-          <a:prstGeom prst="line">
+          <a:xfrm flipH="1" flipV="1">
+            <a:off x="3397200" y="1140857"/>
+            <a:ext cx="2698800" cy="350668"/>
+          </a:xfrm>
+          <a:prstGeom prst="straightConnector1">
             <a:avLst/>
           </a:prstGeom>
+          <a:ln>
+            <a:tailEnd type="triangle"/>
+          </a:ln>
         </p:spPr>
         <p:style>
           <a:lnRef idx="2">
@@ -4371,142 +4044,10 @@
       </p:cxnSp>
       <p:cxnSp>
         <p:nvCxnSpPr>
-          <p:cNvPr id="65" name="Straight Connector 64">
-            <a:extLst>
-              <a:ext uri="{FF2B5EF4-FFF2-40B4-BE49-F238E27FC236}">
-                <a16:creationId xmlns:a16="http://schemas.microsoft.com/office/drawing/2014/main" id="{03FD6F95-DA3D-7C49-BDA4-F9BE3AA995DF}"/>
-              </a:ext>
-            </a:extLst>
-          </p:cNvPr>
-          <p:cNvCxnSpPr>
-            <a:cxnSpLocks/>
-          </p:cNvCxnSpPr>
-          <p:nvPr/>
-        </p:nvCxnSpPr>
-        <p:spPr>
-          <a:xfrm>
-            <a:off x="7573856" y="5591802"/>
-            <a:ext cx="230944" cy="0"/>
-          </a:xfrm>
-          <a:prstGeom prst="line">
-            <a:avLst/>
-          </a:prstGeom>
-        </p:spPr>
-        <p:style>
-          <a:lnRef idx="2">
-            <a:schemeClr val="accent5"/>
-          </a:lnRef>
-          <a:fillRef idx="0">
-            <a:schemeClr val="accent5"/>
-          </a:fillRef>
-          <a:effectRef idx="1">
-            <a:schemeClr val="accent5"/>
-          </a:effectRef>
-          <a:fontRef idx="minor">
-            <a:schemeClr val="tx1"/>
-          </a:fontRef>
-        </p:style>
-      </p:cxnSp>
-      <p:sp>
-        <p:nvSpPr>
-          <p:cNvPr id="67" name="TextBox 66">
-            <a:hlinkClick r:id="rId4" action="ppaction://hlinksldjump"/>
-            <a:extLst>
-              <a:ext uri="{FF2B5EF4-FFF2-40B4-BE49-F238E27FC236}">
-                <a16:creationId xmlns:a16="http://schemas.microsoft.com/office/drawing/2014/main" id="{F12FFD72-DA71-8245-8165-CDB63F5B1DFC}"/>
-              </a:ext>
-            </a:extLst>
-          </p:cNvPr>
-          <p:cNvSpPr txBox="1"/>
-          <p:nvPr/>
-        </p:nvSpPr>
-        <p:spPr>
-          <a:xfrm>
-            <a:off x="63795" y="63795"/>
-            <a:ext cx="899331" cy="338554"/>
-          </a:xfrm>
-          <a:prstGeom prst="rect">
-            <a:avLst/>
-          </a:prstGeom>
-          <a:noFill/>
-          <a:ln cap="sq">
-            <a:noFill/>
-          </a:ln>
-        </p:spPr>
-        <p:txBody>
-          <a:bodyPr wrap="square" rtlCol="0">
-            <a:spAutoFit/>
-          </a:bodyPr>
-          <a:lstStyle/>
-          <a:p>
-            <a:pPr algn="ctr"/>
-            <a:r>
-              <a:rPr lang="en-US" sz="1600" dirty="0">
-                <a:solidFill>
-                  <a:srgbClr val="5B9BD5"/>
-                </a:solidFill>
-              </a:rPr>
-              <a:t>Home</a:t>
-            </a:r>
-            <a:endParaRPr lang="en-AM" sz="1600" dirty="0">
-              <a:solidFill>
-                <a:srgbClr val="5B9BD5"/>
-              </a:solidFill>
-            </a:endParaRPr>
-          </a:p>
-        </p:txBody>
-      </p:sp>
-      <p:sp>
-        <p:nvSpPr>
-          <p:cNvPr id="68" name="TextBox 67">
-            <a:extLst>
-              <a:ext uri="{FF2B5EF4-FFF2-40B4-BE49-F238E27FC236}">
-                <a16:creationId xmlns:a16="http://schemas.microsoft.com/office/drawing/2014/main" id="{E15474DC-6D01-934F-A2B0-CF8C6F1A73D0}"/>
-              </a:ext>
-            </a:extLst>
-          </p:cNvPr>
-          <p:cNvSpPr txBox="1"/>
-          <p:nvPr/>
-        </p:nvSpPr>
-        <p:spPr>
-          <a:xfrm>
-            <a:off x="2407200" y="771525"/>
-            <a:ext cx="1980000" cy="369332"/>
-          </a:xfrm>
-          <a:prstGeom prst="rect">
-            <a:avLst/>
-          </a:prstGeom>
-          <a:noFill/>
-          <a:ln cap="sq">
-            <a:solidFill>
-              <a:srgbClr val="212121"/>
-            </a:solidFill>
-          </a:ln>
-        </p:spPr>
-        <p:txBody>
-          <a:bodyPr wrap="square" rtlCol="0">
-            <a:spAutoFit/>
-          </a:bodyPr>
-          <a:lstStyle/>
-          <a:p>
-            <a:pPr algn="ctr"/>
-            <a:r>
-              <a:rPr lang="en-AM" dirty="0">
-                <a:solidFill>
-                  <a:srgbClr val="212121"/>
-                </a:solidFill>
-              </a:rPr>
-              <a:t>state.js</a:t>
-            </a:r>
-          </a:p>
-        </p:txBody>
-      </p:sp>
-      <p:cxnSp>
-        <p:nvCxnSpPr>
-          <p:cNvPr id="69" name="Straight Connector 68">
-            <a:extLst>
-              <a:ext uri="{FF2B5EF4-FFF2-40B4-BE49-F238E27FC236}">
-                <a16:creationId xmlns:a16="http://schemas.microsoft.com/office/drawing/2014/main" id="{16AE14D9-8FE6-F14D-BE23-A6C28435C72C}"/>
+          <p:cNvPr id="106" name="Straight Arrow Connector 105">
+            <a:extLst>
+              <a:ext uri="{FF2B5EF4-FFF2-40B4-BE49-F238E27FC236}">
+                <a16:creationId xmlns:a16="http://schemas.microsoft.com/office/drawing/2014/main" id="{ABDEC4BB-56ED-1145-9D45-1841E0D72882}"/>
               </a:ext>
             </a:extLst>
           </p:cNvPr>
@@ -4518,13 +4059,16 @@
           <p:nvPr/>
         </p:nvCxnSpPr>
         <p:spPr>
-          <a:xfrm flipV="1">
-            <a:off x="4387200" y="951525"/>
-            <a:ext cx="718800" cy="4666"/>
-          </a:xfrm>
-          <a:prstGeom prst="line">
+          <a:xfrm>
+            <a:off x="4387200" y="956191"/>
+            <a:ext cx="718800" cy="0"/>
+          </a:xfrm>
+          <a:prstGeom prst="straightConnector1">
             <a:avLst/>
           </a:prstGeom>
+          <a:ln>
+            <a:tailEnd type="triangle"/>
+          </a:ln>
         </p:spPr>
         <p:style>
           <a:lnRef idx="2">
@@ -4614,22 +4158,31 @@
           <a:p>
             <a:pPr algn="ctr"/>
             <a:r>
+              <a:rPr lang="en-US" dirty="0">
+                <a:solidFill>
+                  <a:srgbClr val="212121"/>
+                </a:solidFill>
+              </a:rPr>
+              <a:t>content</a:t>
+            </a:r>
+            <a:r>
               <a:rPr lang="en-AM" dirty="0">
                 <a:solidFill>
                   <a:srgbClr val="212121"/>
                 </a:solidFill>
               </a:rPr>
-              <a:t>proflie.js</a:t>
-            </a:r>
-          </a:p>
-        </p:txBody>
-      </p:sp>
-      <p:sp>
-        <p:nvSpPr>
-          <p:cNvPr id="9" name="TextBox 8">
-            <a:extLst>
-              <a:ext uri="{FF2B5EF4-FFF2-40B4-BE49-F238E27FC236}">
-                <a16:creationId xmlns:a16="http://schemas.microsoft.com/office/drawing/2014/main" id="{92EC1DAD-B77E-7643-9325-8587FAC8E231}"/>
+              <a:t>.js</a:t>
+            </a:r>
+          </a:p>
+        </p:txBody>
+      </p:sp>
+      <p:sp>
+        <p:nvSpPr>
+          <p:cNvPr id="27" name="TextBox 26">
+            <a:hlinkClick r:id="rId2" action="ppaction://hlinksldjump"/>
+            <a:extLst>
+              <a:ext uri="{FF2B5EF4-FFF2-40B4-BE49-F238E27FC236}">
+                <a16:creationId xmlns:a16="http://schemas.microsoft.com/office/drawing/2014/main" id="{C167CD91-2DDD-9E44-819E-C51B623CC4E7}"/>
               </a:ext>
             </a:extLst>
           </p:cNvPr>
@@ -4638,7 +4191,7 @@
         </p:nvSpPr>
         <p:spPr>
           <a:xfrm>
-            <a:off x="3754800" y="1490400"/>
+            <a:off x="5105999" y="1491525"/>
             <a:ext cx="1980000" cy="369332"/>
           </a:xfrm>
           <a:prstGeom prst="rect">
@@ -4659,70 +4212,23 @@
           <a:p>
             <a:pPr algn="ctr"/>
             <a:r>
-              <a:rPr lang="en-US" dirty="0">
-                <a:solidFill>
-                  <a:srgbClr val="212121"/>
-                </a:solidFill>
-              </a:rPr>
-              <a:t>profile-info</a:t>
-            </a:r>
-            <a:r>
               <a:rPr lang="en-AM" dirty="0">
                 <a:solidFill>
                   <a:srgbClr val="212121"/>
                 </a:solidFill>
               </a:rPr>
-              <a:t>.js</a:t>
-            </a:r>
-          </a:p>
-        </p:txBody>
-      </p:sp>
-      <p:cxnSp>
-        <p:nvCxnSpPr>
-          <p:cNvPr id="16" name="Straight Connector 15">
-            <a:extLst>
-              <a:ext uri="{FF2B5EF4-FFF2-40B4-BE49-F238E27FC236}">
-                <a16:creationId xmlns:a16="http://schemas.microsoft.com/office/drawing/2014/main" id="{CC7B0AEE-119E-DE46-8820-BD34D7EB4FDD}"/>
-              </a:ext>
-            </a:extLst>
-          </p:cNvPr>
-          <p:cNvCxnSpPr>
-            <a:cxnSpLocks/>
-            <a:stCxn id="9" idx="0"/>
-            <a:endCxn id="5" idx="2"/>
-          </p:cNvCxnSpPr>
-          <p:nvPr/>
-        </p:nvCxnSpPr>
-        <p:spPr>
-          <a:xfrm flipV="1">
-            <a:off x="4744800" y="1140857"/>
-            <a:ext cx="1351200" cy="349543"/>
-          </a:xfrm>
-          <a:prstGeom prst="line">
-            <a:avLst/>
-          </a:prstGeom>
-        </p:spPr>
-        <p:style>
-          <a:lnRef idx="2">
-            <a:schemeClr val="accent5"/>
-          </a:lnRef>
-          <a:fillRef idx="0">
-            <a:schemeClr val="accent5"/>
-          </a:fillRef>
-          <a:effectRef idx="1">
-            <a:schemeClr val="accent5"/>
-          </a:effectRef>
-          <a:fontRef idx="minor">
-            <a:schemeClr val="tx1"/>
-          </a:fontRef>
-        </p:style>
-      </p:cxnSp>
-      <p:sp>
-        <p:nvSpPr>
-          <p:cNvPr id="37" name="TextBox 36">
-            <a:extLst>
-              <a:ext uri="{FF2B5EF4-FFF2-40B4-BE49-F238E27FC236}">
-                <a16:creationId xmlns:a16="http://schemas.microsoft.com/office/drawing/2014/main" id="{15386A37-6C31-FC4A-965E-2AD4923D360B}"/>
+              <a:t>proflie.js</a:t>
+            </a:r>
+          </a:p>
+        </p:txBody>
+      </p:sp>
+      <p:sp>
+        <p:nvSpPr>
+          <p:cNvPr id="29" name="TextBox 28">
+            <a:hlinkClick r:id="rId3" action="ppaction://hlinksldjump"/>
+            <a:extLst>
+              <a:ext uri="{FF2B5EF4-FFF2-40B4-BE49-F238E27FC236}">
+                <a16:creationId xmlns:a16="http://schemas.microsoft.com/office/drawing/2014/main" id="{508562EB-02E3-B044-AC1E-960D51A43DBC}"/>
               </a:ext>
             </a:extLst>
           </p:cNvPr>
@@ -4731,7 +4237,7 @@
         </p:nvSpPr>
         <p:spPr>
           <a:xfrm>
-            <a:off x="6454800" y="1486608"/>
+            <a:off x="5120287" y="1971209"/>
             <a:ext cx="1980000" cy="369332"/>
           </a:xfrm>
           <a:prstGeom prst="rect">
@@ -4752,12 +4258,8 @@
           <a:p>
             <a:pPr algn="ctr"/>
             <a:r>
-              <a:rPr lang="en-US" dirty="0">
-                <a:solidFill>
-                  <a:srgbClr val="212121"/>
-                </a:solidFill>
-              </a:rPr>
-              <a:t>my-posts</a:t>
+              <a:rPr lang="en-US" dirty="0"/>
+              <a:t>messages</a:t>
             </a:r>
             <a:r>
               <a:rPr lang="en-AM" dirty="0">
@@ -4770,52 +4272,12 @@
           </a:p>
         </p:txBody>
       </p:sp>
-      <p:cxnSp>
-        <p:nvCxnSpPr>
-          <p:cNvPr id="38" name="Straight Connector 37">
-            <a:extLst>
-              <a:ext uri="{FF2B5EF4-FFF2-40B4-BE49-F238E27FC236}">
-                <a16:creationId xmlns:a16="http://schemas.microsoft.com/office/drawing/2014/main" id="{B9087D01-2670-2C46-839B-A6164660C5C0}"/>
-              </a:ext>
-            </a:extLst>
-          </p:cNvPr>
-          <p:cNvCxnSpPr>
-            <a:cxnSpLocks/>
-            <a:stCxn id="37" idx="0"/>
-            <a:endCxn id="5" idx="2"/>
-          </p:cNvCxnSpPr>
-          <p:nvPr/>
-        </p:nvCxnSpPr>
-        <p:spPr>
-          <a:xfrm flipH="1" flipV="1">
-            <a:off x="6096000" y="1140857"/>
-            <a:ext cx="1348800" cy="345751"/>
-          </a:xfrm>
-          <a:prstGeom prst="line">
-            <a:avLst/>
-          </a:prstGeom>
-        </p:spPr>
-        <p:style>
-          <a:lnRef idx="2">
-            <a:schemeClr val="accent5"/>
-          </a:lnRef>
-          <a:fillRef idx="0">
-            <a:schemeClr val="accent5"/>
-          </a:fillRef>
-          <a:effectRef idx="1">
-            <a:schemeClr val="accent5"/>
-          </a:effectRef>
-          <a:fontRef idx="minor">
-            <a:schemeClr val="tx1"/>
-          </a:fontRef>
-        </p:style>
-      </p:cxnSp>
-      <p:sp>
-        <p:nvSpPr>
-          <p:cNvPr id="40" name="TextBox 39">
-            <a:extLst>
-              <a:ext uri="{FF2B5EF4-FFF2-40B4-BE49-F238E27FC236}">
-                <a16:creationId xmlns:a16="http://schemas.microsoft.com/office/drawing/2014/main" id="{C3C54C4E-0E11-374C-8967-2F65319041D1}"/>
+      <p:sp>
+        <p:nvSpPr>
+          <p:cNvPr id="33" name="TextBox 32">
+            <a:extLst>
+              <a:ext uri="{FF2B5EF4-FFF2-40B4-BE49-F238E27FC236}">
+                <a16:creationId xmlns:a16="http://schemas.microsoft.com/office/drawing/2014/main" id="{272D2062-9C25-4441-87CB-2638C6BD7420}"/>
               </a:ext>
             </a:extLst>
           </p:cNvPr>
@@ -4824,7 +4286,7 @@
         </p:nvSpPr>
         <p:spPr>
           <a:xfrm>
-            <a:off x="6454800" y="2201691"/>
+            <a:off x="5105999" y="2450893"/>
             <a:ext cx="1980000" cy="369332"/>
           </a:xfrm>
           <a:prstGeom prst="rect">
@@ -4835,7 +4297,6 @@
             <a:solidFill>
               <a:srgbClr val="212121"/>
             </a:solidFill>
-            <a:prstDash val="dash"/>
           </a:ln>
         </p:spPr>
         <p:txBody>
@@ -4851,7 +4312,7 @@
                   <a:srgbClr val="212121"/>
                 </a:solidFill>
               </a:rPr>
-              <a:t>post</a:t>
+              <a:t>users</a:t>
             </a:r>
             <a:r>
               <a:rPr lang="en-AM" dirty="0">
@@ -4864,26 +4325,183 @@
           </a:p>
         </p:txBody>
       </p:sp>
+      <p:sp>
+        <p:nvSpPr>
+          <p:cNvPr id="34" name="TextBox 33">
+            <a:extLst>
+              <a:ext uri="{FF2B5EF4-FFF2-40B4-BE49-F238E27FC236}">
+                <a16:creationId xmlns:a16="http://schemas.microsoft.com/office/drawing/2014/main" id="{26429301-96CB-994C-957E-48A832087BF4}"/>
+              </a:ext>
+            </a:extLst>
+          </p:cNvPr>
+          <p:cNvSpPr txBox="1"/>
+          <p:nvPr/>
+        </p:nvSpPr>
+        <p:spPr>
+          <a:xfrm>
+            <a:off x="5105999" y="2930577"/>
+            <a:ext cx="1980000" cy="369332"/>
+          </a:xfrm>
+          <a:prstGeom prst="rect">
+            <a:avLst/>
+          </a:prstGeom>
+          <a:noFill/>
+          <a:ln cap="sq">
+            <a:solidFill>
+              <a:srgbClr val="212121"/>
+            </a:solidFill>
+          </a:ln>
+        </p:spPr>
+        <p:txBody>
+          <a:bodyPr wrap="square" rtlCol="0">
+            <a:spAutoFit/>
+          </a:bodyPr>
+          <a:lstStyle/>
+          <a:p>
+            <a:pPr algn="ctr"/>
+            <a:r>
+              <a:rPr lang="en-US" dirty="0">
+                <a:solidFill>
+                  <a:srgbClr val="212121"/>
+                </a:solidFill>
+              </a:rPr>
+              <a:t>news</a:t>
+            </a:r>
+            <a:r>
+              <a:rPr lang="en-AM" dirty="0">
+                <a:solidFill>
+                  <a:srgbClr val="212121"/>
+                </a:solidFill>
+              </a:rPr>
+              <a:t>.js</a:t>
+            </a:r>
+          </a:p>
+        </p:txBody>
+      </p:sp>
+      <p:sp>
+        <p:nvSpPr>
+          <p:cNvPr id="35" name="TextBox 34">
+            <a:extLst>
+              <a:ext uri="{FF2B5EF4-FFF2-40B4-BE49-F238E27FC236}">
+                <a16:creationId xmlns:a16="http://schemas.microsoft.com/office/drawing/2014/main" id="{3E3BB8FA-4A28-A34A-AB9F-77FABF0A74F0}"/>
+              </a:ext>
+            </a:extLst>
+          </p:cNvPr>
+          <p:cNvSpPr txBox="1"/>
+          <p:nvPr/>
+        </p:nvSpPr>
+        <p:spPr>
+          <a:xfrm>
+            <a:off x="5105999" y="3410261"/>
+            <a:ext cx="1980000" cy="369332"/>
+          </a:xfrm>
+          <a:prstGeom prst="rect">
+            <a:avLst/>
+          </a:prstGeom>
+          <a:noFill/>
+          <a:ln cap="sq">
+            <a:solidFill>
+              <a:srgbClr val="212121"/>
+            </a:solidFill>
+          </a:ln>
+        </p:spPr>
+        <p:txBody>
+          <a:bodyPr wrap="square" rtlCol="0">
+            <a:spAutoFit/>
+          </a:bodyPr>
+          <a:lstStyle/>
+          <a:p>
+            <a:pPr algn="ctr"/>
+            <a:r>
+              <a:rPr lang="en-US" dirty="0">
+                <a:solidFill>
+                  <a:srgbClr val="212121"/>
+                </a:solidFill>
+              </a:rPr>
+              <a:t>music</a:t>
+            </a:r>
+            <a:r>
+              <a:rPr lang="en-AM" dirty="0">
+                <a:solidFill>
+                  <a:srgbClr val="212121"/>
+                </a:solidFill>
+              </a:rPr>
+              <a:t>.js</a:t>
+            </a:r>
+          </a:p>
+        </p:txBody>
+      </p:sp>
+      <p:sp>
+        <p:nvSpPr>
+          <p:cNvPr id="36" name="TextBox 35">
+            <a:extLst>
+              <a:ext uri="{FF2B5EF4-FFF2-40B4-BE49-F238E27FC236}">
+                <a16:creationId xmlns:a16="http://schemas.microsoft.com/office/drawing/2014/main" id="{7FBD173D-C748-A848-8D01-B72AD620FBF2}"/>
+              </a:ext>
+            </a:extLst>
+          </p:cNvPr>
+          <p:cNvSpPr txBox="1"/>
+          <p:nvPr/>
+        </p:nvSpPr>
+        <p:spPr>
+          <a:xfrm>
+            <a:off x="5105999" y="3889945"/>
+            <a:ext cx="1980000" cy="369332"/>
+          </a:xfrm>
+          <a:prstGeom prst="rect">
+            <a:avLst/>
+          </a:prstGeom>
+          <a:noFill/>
+          <a:ln cap="sq">
+            <a:solidFill>
+              <a:srgbClr val="212121"/>
+            </a:solidFill>
+          </a:ln>
+        </p:spPr>
+        <p:txBody>
+          <a:bodyPr wrap="square" rtlCol="0">
+            <a:spAutoFit/>
+          </a:bodyPr>
+          <a:lstStyle/>
+          <a:p>
+            <a:pPr algn="ctr"/>
+            <a:r>
+              <a:rPr lang="en-US" dirty="0">
+                <a:solidFill>
+                  <a:srgbClr val="212121"/>
+                </a:solidFill>
+              </a:rPr>
+              <a:t>settings</a:t>
+            </a:r>
+            <a:r>
+              <a:rPr lang="en-AM" dirty="0">
+                <a:solidFill>
+                  <a:srgbClr val="212121"/>
+                </a:solidFill>
+              </a:rPr>
+              <a:t>.js</a:t>
+            </a:r>
+          </a:p>
+        </p:txBody>
+      </p:sp>
       <p:cxnSp>
         <p:nvCxnSpPr>
-          <p:cNvPr id="41" name="Straight Connector 40">
-            <a:extLst>
-              <a:ext uri="{FF2B5EF4-FFF2-40B4-BE49-F238E27FC236}">
-                <a16:creationId xmlns:a16="http://schemas.microsoft.com/office/drawing/2014/main" id="{C5124E4F-E00D-2F4E-9271-D43FAEFACA67}"/>
+          <p:cNvPr id="53" name="Straight Connector 52">
+            <a:extLst>
+              <a:ext uri="{FF2B5EF4-FFF2-40B4-BE49-F238E27FC236}">
+                <a16:creationId xmlns:a16="http://schemas.microsoft.com/office/drawing/2014/main" id="{0ECC9334-38B0-4840-8E10-12458768DA40}"/>
               </a:ext>
             </a:extLst>
           </p:cNvPr>
           <p:cNvCxnSpPr>
             <a:cxnSpLocks/>
-            <a:stCxn id="40" idx="0"/>
-            <a:endCxn id="37" idx="2"/>
           </p:cNvCxnSpPr>
           <p:nvPr/>
         </p:nvCxnSpPr>
         <p:spPr>
           <a:xfrm flipV="1">
-            <a:off x="7444800" y="1855940"/>
-            <a:ext cx="0" cy="345751"/>
+            <a:off x="4878826" y="1306859"/>
+            <a:ext cx="0" cy="2767752"/>
           </a:xfrm>
           <a:prstGeom prst="line">
             <a:avLst/>
@@ -4904,13 +4522,242 @@
           </a:fontRef>
         </p:style>
       </p:cxnSp>
-      <p:sp>
-        <p:nvSpPr>
-          <p:cNvPr id="46" name="TextBox 45">
-            <a:hlinkClick r:id="rId2" action="ppaction://hlinksldjump"/>
-            <a:extLst>
-              <a:ext uri="{FF2B5EF4-FFF2-40B4-BE49-F238E27FC236}">
-                <a16:creationId xmlns:a16="http://schemas.microsoft.com/office/drawing/2014/main" id="{25F09C64-7D7E-C440-84F2-5FD2EED6AAF6}"/>
+      <p:cxnSp>
+        <p:nvCxnSpPr>
+          <p:cNvPr id="58" name="Straight Connector 57">
+            <a:extLst>
+              <a:ext uri="{FF2B5EF4-FFF2-40B4-BE49-F238E27FC236}">
+                <a16:creationId xmlns:a16="http://schemas.microsoft.com/office/drawing/2014/main" id="{7510B2CA-2DC8-2949-80DE-46EBDEE4F0CD}"/>
+              </a:ext>
+            </a:extLst>
+          </p:cNvPr>
+          <p:cNvCxnSpPr>
+            <a:cxnSpLocks/>
+            <a:endCxn id="27" idx="1"/>
+          </p:cNvCxnSpPr>
+          <p:nvPr/>
+        </p:nvCxnSpPr>
+        <p:spPr>
+          <a:xfrm>
+            <a:off x="4875055" y="1676191"/>
+            <a:ext cx="230944" cy="0"/>
+          </a:xfrm>
+          <a:prstGeom prst="line">
+            <a:avLst/>
+          </a:prstGeom>
+        </p:spPr>
+        <p:style>
+          <a:lnRef idx="2">
+            <a:schemeClr val="accent5"/>
+          </a:lnRef>
+          <a:fillRef idx="0">
+            <a:schemeClr val="accent5"/>
+          </a:fillRef>
+          <a:effectRef idx="1">
+            <a:schemeClr val="accent5"/>
+          </a:effectRef>
+          <a:fontRef idx="minor">
+            <a:schemeClr val="tx1"/>
+          </a:fontRef>
+        </p:style>
+      </p:cxnSp>
+      <p:cxnSp>
+        <p:nvCxnSpPr>
+          <p:cNvPr id="61" name="Straight Connector 60">
+            <a:extLst>
+              <a:ext uri="{FF2B5EF4-FFF2-40B4-BE49-F238E27FC236}">
+                <a16:creationId xmlns:a16="http://schemas.microsoft.com/office/drawing/2014/main" id="{3FB2CBE8-F458-504B-B72E-D45DE2A95797}"/>
+              </a:ext>
+            </a:extLst>
+          </p:cNvPr>
+          <p:cNvCxnSpPr>
+            <a:cxnSpLocks/>
+          </p:cNvCxnSpPr>
+          <p:nvPr/>
+        </p:nvCxnSpPr>
+        <p:spPr>
+          <a:xfrm>
+            <a:off x="4875055" y="2155875"/>
+            <a:ext cx="230944" cy="0"/>
+          </a:xfrm>
+          <a:prstGeom prst="line">
+            <a:avLst/>
+          </a:prstGeom>
+        </p:spPr>
+        <p:style>
+          <a:lnRef idx="2">
+            <a:schemeClr val="accent5"/>
+          </a:lnRef>
+          <a:fillRef idx="0">
+            <a:schemeClr val="accent5"/>
+          </a:fillRef>
+          <a:effectRef idx="1">
+            <a:schemeClr val="accent5"/>
+          </a:effectRef>
+          <a:fontRef idx="minor">
+            <a:schemeClr val="tx1"/>
+          </a:fontRef>
+        </p:style>
+      </p:cxnSp>
+      <p:cxnSp>
+        <p:nvCxnSpPr>
+          <p:cNvPr id="62" name="Straight Connector 61">
+            <a:extLst>
+              <a:ext uri="{FF2B5EF4-FFF2-40B4-BE49-F238E27FC236}">
+                <a16:creationId xmlns:a16="http://schemas.microsoft.com/office/drawing/2014/main" id="{32ED3222-2A7F-5743-905A-ECC1A8C3BC79}"/>
+              </a:ext>
+            </a:extLst>
+          </p:cNvPr>
+          <p:cNvCxnSpPr>
+            <a:cxnSpLocks/>
+          </p:cNvCxnSpPr>
+          <p:nvPr/>
+        </p:nvCxnSpPr>
+        <p:spPr>
+          <a:xfrm>
+            <a:off x="4875055" y="2635559"/>
+            <a:ext cx="230944" cy="0"/>
+          </a:xfrm>
+          <a:prstGeom prst="line">
+            <a:avLst/>
+          </a:prstGeom>
+        </p:spPr>
+        <p:style>
+          <a:lnRef idx="2">
+            <a:schemeClr val="accent5"/>
+          </a:lnRef>
+          <a:fillRef idx="0">
+            <a:schemeClr val="accent5"/>
+          </a:fillRef>
+          <a:effectRef idx="1">
+            <a:schemeClr val="accent5"/>
+          </a:effectRef>
+          <a:fontRef idx="minor">
+            <a:schemeClr val="tx1"/>
+          </a:fontRef>
+        </p:style>
+      </p:cxnSp>
+      <p:cxnSp>
+        <p:nvCxnSpPr>
+          <p:cNvPr id="63" name="Straight Connector 62">
+            <a:extLst>
+              <a:ext uri="{FF2B5EF4-FFF2-40B4-BE49-F238E27FC236}">
+                <a16:creationId xmlns:a16="http://schemas.microsoft.com/office/drawing/2014/main" id="{C65F2E9A-6B78-3248-BACC-85566F8483B1}"/>
+              </a:ext>
+            </a:extLst>
+          </p:cNvPr>
+          <p:cNvCxnSpPr>
+            <a:cxnSpLocks/>
+          </p:cNvCxnSpPr>
+          <p:nvPr/>
+        </p:nvCxnSpPr>
+        <p:spPr>
+          <a:xfrm>
+            <a:off x="4875055" y="3115243"/>
+            <a:ext cx="230944" cy="0"/>
+          </a:xfrm>
+          <a:prstGeom prst="line">
+            <a:avLst/>
+          </a:prstGeom>
+        </p:spPr>
+        <p:style>
+          <a:lnRef idx="2">
+            <a:schemeClr val="accent5"/>
+          </a:lnRef>
+          <a:fillRef idx="0">
+            <a:schemeClr val="accent5"/>
+          </a:fillRef>
+          <a:effectRef idx="1">
+            <a:schemeClr val="accent5"/>
+          </a:effectRef>
+          <a:fontRef idx="minor">
+            <a:schemeClr val="tx1"/>
+          </a:fontRef>
+        </p:style>
+      </p:cxnSp>
+      <p:cxnSp>
+        <p:nvCxnSpPr>
+          <p:cNvPr id="64" name="Straight Connector 63">
+            <a:extLst>
+              <a:ext uri="{FF2B5EF4-FFF2-40B4-BE49-F238E27FC236}">
+                <a16:creationId xmlns:a16="http://schemas.microsoft.com/office/drawing/2014/main" id="{94D24CEE-01C2-D349-8697-5B7E43AB7D84}"/>
+              </a:ext>
+            </a:extLst>
+          </p:cNvPr>
+          <p:cNvCxnSpPr>
+            <a:cxnSpLocks/>
+          </p:cNvCxnSpPr>
+          <p:nvPr/>
+        </p:nvCxnSpPr>
+        <p:spPr>
+          <a:xfrm>
+            <a:off x="4875055" y="3594927"/>
+            <a:ext cx="230944" cy="0"/>
+          </a:xfrm>
+          <a:prstGeom prst="line">
+            <a:avLst/>
+          </a:prstGeom>
+        </p:spPr>
+        <p:style>
+          <a:lnRef idx="2">
+            <a:schemeClr val="accent5"/>
+          </a:lnRef>
+          <a:fillRef idx="0">
+            <a:schemeClr val="accent5"/>
+          </a:fillRef>
+          <a:effectRef idx="1">
+            <a:schemeClr val="accent5"/>
+          </a:effectRef>
+          <a:fontRef idx="minor">
+            <a:schemeClr val="tx1"/>
+          </a:fontRef>
+        </p:style>
+      </p:cxnSp>
+      <p:cxnSp>
+        <p:nvCxnSpPr>
+          <p:cNvPr id="65" name="Straight Connector 64">
+            <a:extLst>
+              <a:ext uri="{FF2B5EF4-FFF2-40B4-BE49-F238E27FC236}">
+                <a16:creationId xmlns:a16="http://schemas.microsoft.com/office/drawing/2014/main" id="{03FD6F95-DA3D-7C49-BDA4-F9BE3AA995DF}"/>
+              </a:ext>
+            </a:extLst>
+          </p:cNvPr>
+          <p:cNvCxnSpPr>
+            <a:cxnSpLocks/>
+          </p:cNvCxnSpPr>
+          <p:nvPr/>
+        </p:nvCxnSpPr>
+        <p:spPr>
+          <a:xfrm>
+            <a:off x="4875055" y="4074611"/>
+            <a:ext cx="230944" cy="0"/>
+          </a:xfrm>
+          <a:prstGeom prst="line">
+            <a:avLst/>
+          </a:prstGeom>
+        </p:spPr>
+        <p:style>
+          <a:lnRef idx="2">
+            <a:schemeClr val="accent5"/>
+          </a:lnRef>
+          <a:fillRef idx="0">
+            <a:schemeClr val="accent5"/>
+          </a:fillRef>
+          <a:effectRef idx="1">
+            <a:schemeClr val="accent5"/>
+          </a:effectRef>
+          <a:fontRef idx="minor">
+            <a:schemeClr val="tx1"/>
+          </a:fontRef>
+        </p:style>
+      </p:cxnSp>
+      <p:sp>
+        <p:nvSpPr>
+          <p:cNvPr id="67" name="TextBox 66">
+            <a:hlinkClick r:id="rId4" action="ppaction://hlinksldjump"/>
+            <a:extLst>
+              <a:ext uri="{FF2B5EF4-FFF2-40B4-BE49-F238E27FC236}">
+                <a16:creationId xmlns:a16="http://schemas.microsoft.com/office/drawing/2014/main" id="{F12FFD72-DA71-8245-8165-CDB63F5B1DFC}"/>
               </a:ext>
             </a:extLst>
           </p:cNvPr>
@@ -4953,10 +4800,51 @@
           </a:p>
         </p:txBody>
       </p:sp>
+      <p:cxnSp>
+        <p:nvCxnSpPr>
+          <p:cNvPr id="12" name="Elbow Connector 11">
+            <a:extLst>
+              <a:ext uri="{FF2B5EF4-FFF2-40B4-BE49-F238E27FC236}">
+                <a16:creationId xmlns:a16="http://schemas.microsoft.com/office/drawing/2014/main" id="{EA194923-8323-9F43-A02D-C3BD95126B27}"/>
+              </a:ext>
+            </a:extLst>
+          </p:cNvPr>
+          <p:cNvCxnSpPr>
+            <a:endCxn id="5" idx="2"/>
+          </p:cNvCxnSpPr>
+          <p:nvPr/>
+        </p:nvCxnSpPr>
+        <p:spPr>
+          <a:xfrm flipV="1">
+            <a:off x="4875055" y="1140857"/>
+            <a:ext cx="1220945" cy="166002"/>
+          </a:xfrm>
+          <a:prstGeom prst="bentConnector2">
+            <a:avLst/>
+          </a:prstGeom>
+          <a:ln>
+            <a:tailEnd type="triangle"/>
+          </a:ln>
+        </p:spPr>
+        <p:style>
+          <a:lnRef idx="2">
+            <a:schemeClr val="accent5"/>
+          </a:lnRef>
+          <a:fillRef idx="0">
+            <a:schemeClr val="accent5"/>
+          </a:fillRef>
+          <a:effectRef idx="1">
+            <a:schemeClr val="accent5"/>
+          </a:effectRef>
+          <a:fontRef idx="minor">
+            <a:schemeClr val="tx1"/>
+          </a:fontRef>
+        </p:style>
+      </p:cxnSp>
     </p:spTree>
     <p:extLst>
       <p:ext uri="{BB962C8B-B14F-4D97-AF65-F5344CB8AC3E}">
-        <p14:creationId xmlns:p14="http://schemas.microsoft.com/office/powerpoint/2010/main" val="1685091730"/>
+        <p14:creationId xmlns:p14="http://schemas.microsoft.com/office/powerpoint/2010/main" val="2221513058"/>
       </p:ext>
     </p:extLst>
   </p:cSld>
@@ -5026,16 +4914,12 @@
           <a:p>
             <a:pPr algn="ctr"/>
             <a:r>
-              <a:rPr lang="en-US" dirty="0"/>
-              <a:t>messages</a:t>
-            </a:r>
-            <a:r>
               <a:rPr lang="en-AM" dirty="0">
                 <a:solidFill>
                   <a:srgbClr val="212121"/>
                 </a:solidFill>
               </a:rPr>
-              <a:t>.js</a:t>
+              <a:t>proflie.js</a:t>
             </a:r>
           </a:p>
         </p:txBody>
@@ -5075,56 +4959,24 @@
           <a:p>
             <a:pPr algn="ctr"/>
             <a:r>
+              <a:rPr lang="en-US" dirty="0">
+                <a:solidFill>
+                  <a:srgbClr val="212121"/>
+                </a:solidFill>
+              </a:rPr>
+              <a:t>profile-info</a:t>
+            </a:r>
+            <a:r>
               <a:rPr lang="en-AM" dirty="0">
                 <a:solidFill>
                   <a:srgbClr val="212121"/>
                 </a:solidFill>
               </a:rPr>
-              <a:t>contact.js</a:t>
-            </a:r>
-          </a:p>
-        </p:txBody>
-      </p:sp>
-      <p:cxnSp>
-        <p:nvCxnSpPr>
-          <p:cNvPr id="16" name="Straight Connector 15">
-            <a:extLst>
-              <a:ext uri="{FF2B5EF4-FFF2-40B4-BE49-F238E27FC236}">
-                <a16:creationId xmlns:a16="http://schemas.microsoft.com/office/drawing/2014/main" id="{CC7B0AEE-119E-DE46-8820-BD34D7EB4FDD}"/>
-              </a:ext>
-            </a:extLst>
-          </p:cNvPr>
-          <p:cNvCxnSpPr>
-            <a:cxnSpLocks/>
-            <a:stCxn id="9" idx="0"/>
-            <a:endCxn id="5" idx="2"/>
-          </p:cNvCxnSpPr>
-          <p:nvPr/>
-        </p:nvCxnSpPr>
-        <p:spPr>
-          <a:xfrm flipV="1">
-            <a:off x="4744800" y="1140857"/>
-            <a:ext cx="1351200" cy="349543"/>
-          </a:xfrm>
-          <a:prstGeom prst="line">
-            <a:avLst/>
-          </a:prstGeom>
-        </p:spPr>
-        <p:style>
-          <a:lnRef idx="2">
-            <a:schemeClr val="accent5"/>
-          </a:lnRef>
-          <a:fillRef idx="0">
-            <a:schemeClr val="accent5"/>
-          </a:fillRef>
-          <a:effectRef idx="1">
-            <a:schemeClr val="accent5"/>
-          </a:effectRef>
-          <a:fontRef idx="minor">
-            <a:schemeClr val="tx1"/>
-          </a:fontRef>
-        </p:style>
-      </p:cxnSp>
+              <a:t>.js</a:t>
+            </a:r>
+          </a:p>
+        </p:txBody>
+      </p:sp>
       <p:sp>
         <p:nvSpPr>
           <p:cNvPr id="37" name="TextBox 36">
@@ -5160,6 +5012,422 @@
           <a:p>
             <a:pPr algn="ctr"/>
             <a:r>
+              <a:rPr lang="en-US" dirty="0">
+                <a:solidFill>
+                  <a:srgbClr val="212121"/>
+                </a:solidFill>
+              </a:rPr>
+              <a:t>my-posts</a:t>
+            </a:r>
+            <a:r>
+              <a:rPr lang="en-AM" dirty="0">
+                <a:solidFill>
+                  <a:srgbClr val="212121"/>
+                </a:solidFill>
+              </a:rPr>
+              <a:t>.js</a:t>
+            </a:r>
+          </a:p>
+        </p:txBody>
+      </p:sp>
+      <p:sp>
+        <p:nvSpPr>
+          <p:cNvPr id="40" name="TextBox 39">
+            <a:extLst>
+              <a:ext uri="{FF2B5EF4-FFF2-40B4-BE49-F238E27FC236}">
+                <a16:creationId xmlns:a16="http://schemas.microsoft.com/office/drawing/2014/main" id="{C3C54C4E-0E11-374C-8967-2F65319041D1}"/>
+              </a:ext>
+            </a:extLst>
+          </p:cNvPr>
+          <p:cNvSpPr txBox="1"/>
+          <p:nvPr/>
+        </p:nvSpPr>
+        <p:spPr>
+          <a:xfrm>
+            <a:off x="6454800" y="2201691"/>
+            <a:ext cx="1980000" cy="369332"/>
+          </a:xfrm>
+          <a:prstGeom prst="rect">
+            <a:avLst/>
+          </a:prstGeom>
+          <a:noFill/>
+          <a:ln cap="sq">
+            <a:solidFill>
+              <a:srgbClr val="212121"/>
+            </a:solidFill>
+            <a:prstDash val="dash"/>
+          </a:ln>
+        </p:spPr>
+        <p:txBody>
+          <a:bodyPr wrap="square" rtlCol="0">
+            <a:spAutoFit/>
+          </a:bodyPr>
+          <a:lstStyle/>
+          <a:p>
+            <a:pPr algn="ctr"/>
+            <a:r>
+              <a:rPr lang="en-US" dirty="0">
+                <a:solidFill>
+                  <a:srgbClr val="212121"/>
+                </a:solidFill>
+              </a:rPr>
+              <a:t>post</a:t>
+            </a:r>
+            <a:r>
+              <a:rPr lang="en-AM" dirty="0">
+                <a:solidFill>
+                  <a:srgbClr val="212121"/>
+                </a:solidFill>
+              </a:rPr>
+              <a:t>.js</a:t>
+            </a:r>
+          </a:p>
+        </p:txBody>
+      </p:sp>
+      <p:sp>
+        <p:nvSpPr>
+          <p:cNvPr id="46" name="TextBox 45">
+            <a:hlinkClick r:id="rId2" action="ppaction://hlinksldjump"/>
+            <a:extLst>
+              <a:ext uri="{FF2B5EF4-FFF2-40B4-BE49-F238E27FC236}">
+                <a16:creationId xmlns:a16="http://schemas.microsoft.com/office/drawing/2014/main" id="{25F09C64-7D7E-C440-84F2-5FD2EED6AAF6}"/>
+              </a:ext>
+            </a:extLst>
+          </p:cNvPr>
+          <p:cNvSpPr txBox="1"/>
+          <p:nvPr/>
+        </p:nvSpPr>
+        <p:spPr>
+          <a:xfrm>
+            <a:off x="63795" y="63795"/>
+            <a:ext cx="899331" cy="338554"/>
+          </a:xfrm>
+          <a:prstGeom prst="rect">
+            <a:avLst/>
+          </a:prstGeom>
+          <a:noFill/>
+          <a:ln cap="sq">
+            <a:noFill/>
+          </a:ln>
+        </p:spPr>
+        <p:txBody>
+          <a:bodyPr wrap="square" rtlCol="0">
+            <a:spAutoFit/>
+          </a:bodyPr>
+          <a:lstStyle/>
+          <a:p>
+            <a:pPr algn="ctr"/>
+            <a:r>
+              <a:rPr lang="en-US" sz="1600" dirty="0">
+                <a:solidFill>
+                  <a:srgbClr val="5B9BD5"/>
+                </a:solidFill>
+              </a:rPr>
+              <a:t>Home</a:t>
+            </a:r>
+            <a:endParaRPr lang="en-AM" sz="1600" dirty="0">
+              <a:solidFill>
+                <a:srgbClr val="5B9BD5"/>
+              </a:solidFill>
+            </a:endParaRPr>
+          </a:p>
+        </p:txBody>
+      </p:sp>
+      <p:cxnSp>
+        <p:nvCxnSpPr>
+          <p:cNvPr id="30" name="Straight Arrow Connector 29">
+            <a:extLst>
+              <a:ext uri="{FF2B5EF4-FFF2-40B4-BE49-F238E27FC236}">
+                <a16:creationId xmlns:a16="http://schemas.microsoft.com/office/drawing/2014/main" id="{7446B141-AA1B-E64F-A3A0-F57934190E86}"/>
+              </a:ext>
+            </a:extLst>
+          </p:cNvPr>
+          <p:cNvCxnSpPr>
+            <a:cxnSpLocks/>
+            <a:stCxn id="40" idx="0"/>
+            <a:endCxn id="37" idx="2"/>
+          </p:cNvCxnSpPr>
+          <p:nvPr/>
+        </p:nvCxnSpPr>
+        <p:spPr>
+          <a:xfrm flipV="1">
+            <a:off x="7444800" y="1855940"/>
+            <a:ext cx="0" cy="345751"/>
+          </a:xfrm>
+          <a:prstGeom prst="straightConnector1">
+            <a:avLst/>
+          </a:prstGeom>
+          <a:ln>
+            <a:tailEnd type="triangle"/>
+          </a:ln>
+        </p:spPr>
+        <p:style>
+          <a:lnRef idx="2">
+            <a:schemeClr val="accent5"/>
+          </a:lnRef>
+          <a:fillRef idx="0">
+            <a:schemeClr val="accent5"/>
+          </a:fillRef>
+          <a:effectRef idx="1">
+            <a:schemeClr val="accent5"/>
+          </a:effectRef>
+          <a:fontRef idx="minor">
+            <a:schemeClr val="tx1"/>
+          </a:fontRef>
+        </p:style>
+      </p:cxnSp>
+      <p:cxnSp>
+        <p:nvCxnSpPr>
+          <p:cNvPr id="49" name="Straight Arrow Connector 48">
+            <a:extLst>
+              <a:ext uri="{FF2B5EF4-FFF2-40B4-BE49-F238E27FC236}">
+                <a16:creationId xmlns:a16="http://schemas.microsoft.com/office/drawing/2014/main" id="{094FA3FD-8E1B-D441-828D-C40C17817B1D}"/>
+              </a:ext>
+            </a:extLst>
+          </p:cNvPr>
+          <p:cNvCxnSpPr>
+            <a:cxnSpLocks/>
+            <a:stCxn id="9" idx="0"/>
+            <a:endCxn id="5" idx="2"/>
+          </p:cNvCxnSpPr>
+          <p:nvPr/>
+        </p:nvCxnSpPr>
+        <p:spPr>
+          <a:xfrm flipV="1">
+            <a:off x="4744800" y="1140857"/>
+            <a:ext cx="1351200" cy="349543"/>
+          </a:xfrm>
+          <a:prstGeom prst="straightConnector1">
+            <a:avLst/>
+          </a:prstGeom>
+          <a:ln>
+            <a:tailEnd type="triangle"/>
+          </a:ln>
+        </p:spPr>
+        <p:style>
+          <a:lnRef idx="2">
+            <a:schemeClr val="accent5"/>
+          </a:lnRef>
+          <a:fillRef idx="0">
+            <a:schemeClr val="accent5"/>
+          </a:fillRef>
+          <a:effectRef idx="1">
+            <a:schemeClr val="accent5"/>
+          </a:effectRef>
+          <a:fontRef idx="minor">
+            <a:schemeClr val="tx1"/>
+          </a:fontRef>
+        </p:style>
+      </p:cxnSp>
+      <p:cxnSp>
+        <p:nvCxnSpPr>
+          <p:cNvPr id="51" name="Straight Arrow Connector 50">
+            <a:extLst>
+              <a:ext uri="{FF2B5EF4-FFF2-40B4-BE49-F238E27FC236}">
+                <a16:creationId xmlns:a16="http://schemas.microsoft.com/office/drawing/2014/main" id="{CF367B5B-5E7F-E347-BE14-C384F294AB32}"/>
+              </a:ext>
+            </a:extLst>
+          </p:cNvPr>
+          <p:cNvCxnSpPr>
+            <a:cxnSpLocks/>
+            <a:stCxn id="37" idx="0"/>
+          </p:cNvCxnSpPr>
+          <p:nvPr/>
+        </p:nvCxnSpPr>
+        <p:spPr>
+          <a:xfrm flipH="1" flipV="1">
+            <a:off x="6096000" y="1140858"/>
+            <a:ext cx="1348800" cy="345750"/>
+          </a:xfrm>
+          <a:prstGeom prst="straightConnector1">
+            <a:avLst/>
+          </a:prstGeom>
+          <a:ln>
+            <a:tailEnd type="triangle"/>
+          </a:ln>
+        </p:spPr>
+        <p:style>
+          <a:lnRef idx="2">
+            <a:schemeClr val="accent5"/>
+          </a:lnRef>
+          <a:fillRef idx="0">
+            <a:schemeClr val="accent5"/>
+          </a:fillRef>
+          <a:effectRef idx="1">
+            <a:schemeClr val="accent5"/>
+          </a:effectRef>
+          <a:fontRef idx="minor">
+            <a:schemeClr val="tx1"/>
+          </a:fontRef>
+        </p:style>
+      </p:cxnSp>
+    </p:spTree>
+    <p:extLst>
+      <p:ext uri="{BB962C8B-B14F-4D97-AF65-F5344CB8AC3E}">
+        <p14:creationId xmlns:p14="http://schemas.microsoft.com/office/powerpoint/2010/main" val="1685091730"/>
+      </p:ext>
+    </p:extLst>
+  </p:cSld>
+  <p:clrMapOvr>
+    <a:masterClrMapping/>
+  </p:clrMapOvr>
+</p:sld>
+</file>
+
+<file path=ppt/slides/slide4.xml><?xml version="1.0" encoding="utf-8"?>
+<p:sld xmlns:a="http://schemas.openxmlformats.org/drawingml/2006/main" xmlns:r="http://schemas.openxmlformats.org/officeDocument/2006/relationships" xmlns:p="http://schemas.openxmlformats.org/presentationml/2006/main">
+  <p:cSld>
+    <p:bg>
+      <p:bgPr>
+        <a:solidFill>
+          <a:srgbClr val="C8C8C8"/>
+        </a:solidFill>
+        <a:effectLst/>
+      </p:bgPr>
+    </p:bg>
+    <p:spTree>
+      <p:nvGrpSpPr>
+        <p:cNvPr id="1" name=""/>
+        <p:cNvGrpSpPr/>
+        <p:nvPr/>
+      </p:nvGrpSpPr>
+      <p:grpSpPr>
+        <a:xfrm>
+          <a:off x="0" y="0"/>
+          <a:ext cx="0" cy="0"/>
+          <a:chOff x="0" y="0"/>
+          <a:chExt cx="0" cy="0"/>
+        </a:xfrm>
+      </p:grpSpPr>
+      <p:sp>
+        <p:nvSpPr>
+          <p:cNvPr id="5" name="TextBox 4">
+            <a:extLst>
+              <a:ext uri="{FF2B5EF4-FFF2-40B4-BE49-F238E27FC236}">
+                <a16:creationId xmlns:a16="http://schemas.microsoft.com/office/drawing/2014/main" id="{46FF7F86-280E-FA45-87ED-B40A028F4644}"/>
+              </a:ext>
+            </a:extLst>
+          </p:cNvPr>
+          <p:cNvSpPr txBox="1"/>
+          <p:nvPr/>
+        </p:nvSpPr>
+        <p:spPr>
+          <a:xfrm>
+            <a:off x="5106000" y="771525"/>
+            <a:ext cx="1980000" cy="369332"/>
+          </a:xfrm>
+          <a:prstGeom prst="rect">
+            <a:avLst/>
+          </a:prstGeom>
+          <a:noFill/>
+          <a:ln cap="sq">
+            <a:solidFill>
+              <a:srgbClr val="212121"/>
+            </a:solidFill>
+          </a:ln>
+        </p:spPr>
+        <p:txBody>
+          <a:bodyPr wrap="square" rtlCol="0">
+            <a:spAutoFit/>
+          </a:bodyPr>
+          <a:lstStyle/>
+          <a:p>
+            <a:pPr algn="ctr"/>
+            <a:r>
+              <a:rPr lang="en-US" dirty="0"/>
+              <a:t>messages</a:t>
+            </a:r>
+            <a:r>
+              <a:rPr lang="en-AM" dirty="0">
+                <a:solidFill>
+                  <a:srgbClr val="212121"/>
+                </a:solidFill>
+              </a:rPr>
+              <a:t>.js</a:t>
+            </a:r>
+          </a:p>
+        </p:txBody>
+      </p:sp>
+      <p:sp>
+        <p:nvSpPr>
+          <p:cNvPr id="9" name="TextBox 8">
+            <a:extLst>
+              <a:ext uri="{FF2B5EF4-FFF2-40B4-BE49-F238E27FC236}">
+                <a16:creationId xmlns:a16="http://schemas.microsoft.com/office/drawing/2014/main" id="{92EC1DAD-B77E-7643-9325-8587FAC8E231}"/>
+              </a:ext>
+            </a:extLst>
+          </p:cNvPr>
+          <p:cNvSpPr txBox="1"/>
+          <p:nvPr/>
+        </p:nvSpPr>
+        <p:spPr>
+          <a:xfrm>
+            <a:off x="3754800" y="1490400"/>
+            <a:ext cx="1980000" cy="369332"/>
+          </a:xfrm>
+          <a:prstGeom prst="rect">
+            <a:avLst/>
+          </a:prstGeom>
+          <a:noFill/>
+          <a:ln cap="sq">
+            <a:solidFill>
+              <a:srgbClr val="212121"/>
+            </a:solidFill>
+          </a:ln>
+        </p:spPr>
+        <p:txBody>
+          <a:bodyPr wrap="square" rtlCol="0">
+            <a:spAutoFit/>
+          </a:bodyPr>
+          <a:lstStyle/>
+          <a:p>
+            <a:pPr algn="ctr"/>
+            <a:r>
+              <a:rPr lang="en-AM" dirty="0">
+                <a:solidFill>
+                  <a:srgbClr val="212121"/>
+                </a:solidFill>
+              </a:rPr>
+              <a:t>contact.js</a:t>
+            </a:r>
+          </a:p>
+        </p:txBody>
+      </p:sp>
+      <p:sp>
+        <p:nvSpPr>
+          <p:cNvPr id="37" name="TextBox 36">
+            <a:extLst>
+              <a:ext uri="{FF2B5EF4-FFF2-40B4-BE49-F238E27FC236}">
+                <a16:creationId xmlns:a16="http://schemas.microsoft.com/office/drawing/2014/main" id="{15386A37-6C31-FC4A-965E-2AD4923D360B}"/>
+              </a:ext>
+            </a:extLst>
+          </p:cNvPr>
+          <p:cNvSpPr txBox="1"/>
+          <p:nvPr/>
+        </p:nvSpPr>
+        <p:spPr>
+          <a:xfrm>
+            <a:off x="6454800" y="1486608"/>
+            <a:ext cx="1980000" cy="369332"/>
+          </a:xfrm>
+          <a:prstGeom prst="rect">
+            <a:avLst/>
+          </a:prstGeom>
+          <a:noFill/>
+          <a:ln cap="sq">
+            <a:solidFill>
+              <a:srgbClr val="212121"/>
+            </a:solidFill>
+          </a:ln>
+        </p:spPr>
+        <p:txBody>
+          <a:bodyPr wrap="square" rtlCol="0">
+            <a:spAutoFit/>
+          </a:bodyPr>
+          <a:lstStyle/>
+          <a:p>
+            <a:pPr algn="ctr"/>
+            <a:r>
               <a:rPr lang="en-AM" dirty="0">
                 <a:solidFill>
                   <a:srgbClr val="212121"/>
@@ -5170,12 +5438,104 @@
           </a:p>
         </p:txBody>
       </p:sp>
+      <p:sp>
+        <p:nvSpPr>
+          <p:cNvPr id="10" name="TextBox 9">
+            <a:hlinkClick r:id="rId2" action="ppaction://hlinksldjump"/>
+            <a:extLst>
+              <a:ext uri="{FF2B5EF4-FFF2-40B4-BE49-F238E27FC236}">
+                <a16:creationId xmlns:a16="http://schemas.microsoft.com/office/drawing/2014/main" id="{DCDCB6FF-5E3A-F747-B077-4048E66C0466}"/>
+              </a:ext>
+            </a:extLst>
+          </p:cNvPr>
+          <p:cNvSpPr txBox="1"/>
+          <p:nvPr/>
+        </p:nvSpPr>
+        <p:spPr>
+          <a:xfrm>
+            <a:off x="63795" y="63795"/>
+            <a:ext cx="899331" cy="338554"/>
+          </a:xfrm>
+          <a:prstGeom prst="rect">
+            <a:avLst/>
+          </a:prstGeom>
+          <a:noFill/>
+          <a:ln cap="sq">
+            <a:noFill/>
+          </a:ln>
+        </p:spPr>
+        <p:txBody>
+          <a:bodyPr wrap="square" rtlCol="0">
+            <a:spAutoFit/>
+          </a:bodyPr>
+          <a:lstStyle/>
+          <a:p>
+            <a:pPr algn="ctr"/>
+            <a:r>
+              <a:rPr lang="en-US" sz="1600" dirty="0">
+                <a:solidFill>
+                  <a:srgbClr val="5B9BD5"/>
+                </a:solidFill>
+              </a:rPr>
+              <a:t>Home</a:t>
+            </a:r>
+            <a:endParaRPr lang="en-AM" sz="1600" dirty="0">
+              <a:solidFill>
+                <a:srgbClr val="5B9BD5"/>
+              </a:solidFill>
+            </a:endParaRPr>
+          </a:p>
+        </p:txBody>
+      </p:sp>
       <p:cxnSp>
         <p:nvCxnSpPr>
-          <p:cNvPr id="38" name="Straight Connector 37">
-            <a:extLst>
-              <a:ext uri="{FF2B5EF4-FFF2-40B4-BE49-F238E27FC236}">
-                <a16:creationId xmlns:a16="http://schemas.microsoft.com/office/drawing/2014/main" id="{B9087D01-2670-2C46-839B-A6164660C5C0}"/>
+          <p:cNvPr id="11" name="Straight Arrow Connector 10">
+            <a:extLst>
+              <a:ext uri="{FF2B5EF4-FFF2-40B4-BE49-F238E27FC236}">
+                <a16:creationId xmlns:a16="http://schemas.microsoft.com/office/drawing/2014/main" id="{A36D9E72-8723-5D49-BC47-F5F37C4E0DFB}"/>
+              </a:ext>
+            </a:extLst>
+          </p:cNvPr>
+          <p:cNvCxnSpPr>
+            <a:cxnSpLocks/>
+            <a:stCxn id="9" idx="0"/>
+            <a:endCxn id="5" idx="2"/>
+          </p:cNvCxnSpPr>
+          <p:nvPr/>
+        </p:nvCxnSpPr>
+        <p:spPr>
+          <a:xfrm flipV="1">
+            <a:off x="4744800" y="1140857"/>
+            <a:ext cx="1351200" cy="349543"/>
+          </a:xfrm>
+          <a:prstGeom prst="straightConnector1">
+            <a:avLst/>
+          </a:prstGeom>
+          <a:ln>
+            <a:tailEnd type="triangle"/>
+          </a:ln>
+        </p:spPr>
+        <p:style>
+          <a:lnRef idx="2">
+            <a:schemeClr val="accent5"/>
+          </a:lnRef>
+          <a:fillRef idx="0">
+            <a:schemeClr val="accent5"/>
+          </a:fillRef>
+          <a:effectRef idx="1">
+            <a:schemeClr val="accent5"/>
+          </a:effectRef>
+          <a:fontRef idx="minor">
+            <a:schemeClr val="tx1"/>
+          </a:fontRef>
+        </p:style>
+      </p:cxnSp>
+      <p:cxnSp>
+        <p:nvCxnSpPr>
+          <p:cNvPr id="12" name="Straight Arrow Connector 11">
+            <a:extLst>
+              <a:ext uri="{FF2B5EF4-FFF2-40B4-BE49-F238E27FC236}">
+                <a16:creationId xmlns:a16="http://schemas.microsoft.com/office/drawing/2014/main" id="{03D65E21-0563-7C49-B249-DFD45A3C2D08}"/>
               </a:ext>
             </a:extLst>
           </p:cNvPr>
@@ -5191,9 +5551,12 @@
             <a:off x="6096000" y="1140857"/>
             <a:ext cx="1348800" cy="345751"/>
           </a:xfrm>
-          <a:prstGeom prst="line">
+          <a:prstGeom prst="straightConnector1">
             <a:avLst/>
           </a:prstGeom>
+          <a:ln>
+            <a:tailEnd type="triangle"/>
+          </a:ln>
         </p:spPr>
         <p:style>
           <a:lnRef idx="2">
@@ -5210,55 +5573,6 @@
           </a:fontRef>
         </p:style>
       </p:cxnSp>
-      <p:sp>
-        <p:nvSpPr>
-          <p:cNvPr id="10" name="TextBox 9">
-            <a:hlinkClick r:id="rId2" action="ppaction://hlinksldjump"/>
-            <a:extLst>
-              <a:ext uri="{FF2B5EF4-FFF2-40B4-BE49-F238E27FC236}">
-                <a16:creationId xmlns:a16="http://schemas.microsoft.com/office/drawing/2014/main" id="{DCDCB6FF-5E3A-F747-B077-4048E66C0466}"/>
-              </a:ext>
-            </a:extLst>
-          </p:cNvPr>
-          <p:cNvSpPr txBox="1"/>
-          <p:nvPr/>
-        </p:nvSpPr>
-        <p:spPr>
-          <a:xfrm>
-            <a:off x="63795" y="63795"/>
-            <a:ext cx="899331" cy="338554"/>
-          </a:xfrm>
-          <a:prstGeom prst="rect">
-            <a:avLst/>
-          </a:prstGeom>
-          <a:noFill/>
-          <a:ln cap="sq">
-            <a:noFill/>
-          </a:ln>
-        </p:spPr>
-        <p:txBody>
-          <a:bodyPr wrap="square" rtlCol="0">
-            <a:spAutoFit/>
-          </a:bodyPr>
-          <a:lstStyle/>
-          <a:p>
-            <a:pPr algn="ctr"/>
-            <a:r>
-              <a:rPr lang="en-US" sz="1600" dirty="0">
-                <a:solidFill>
-                  <a:srgbClr val="5B9BD5"/>
-                </a:solidFill>
-              </a:rPr>
-              <a:t>Home</a:t>
-            </a:r>
-            <a:endParaRPr lang="en-AM" sz="1600" dirty="0">
-              <a:solidFill>
-                <a:srgbClr val="5B9BD5"/>
-              </a:solidFill>
-            </a:endParaRPr>
-          </a:p>
-        </p:txBody>
-      </p:sp>
     </p:spTree>
     <p:extLst>
       <p:ext uri="{BB962C8B-B14F-4D97-AF65-F5344CB8AC3E}">

</xml_diff>